<commit_message>
Prime modifiche alla logica della presentazione
</commit_message>
<xml_diff>
--- a/I Due Moschettieri.pptx
+++ b/I Due Moschettieri.pptx
@@ -7,6 +7,13 @@
   <p:sldIdLst>
     <p:sldId id="257" r:id="rId2"/>
     <p:sldId id="258" r:id="rId3"/>
+    <p:sldId id="259" r:id="rId4"/>
+    <p:sldId id="261" r:id="rId5"/>
+    <p:sldId id="260" r:id="rId6"/>
+    <p:sldId id="262" r:id="rId7"/>
+    <p:sldId id="263" r:id="rId8"/>
+    <p:sldId id="264" r:id="rId9"/>
+    <p:sldId id="265" r:id="rId10"/>
   </p:sldIdLst>
   <p:sldSz cx="12192000" cy="6858000"/>
   <p:notesSz cx="6858000" cy="9144000"/>
@@ -105,6 +112,11 @@
       </a:defRPr>
     </a:lvl9pPr>
   </p:defaultTextStyle>
+  <p:extLst>
+    <p:ext uri="{EFAFB233-063F-42B5-8137-9DF3F51BA10A}">
+      <p15:sldGuideLst xmlns:p15="http://schemas.microsoft.com/office/powerpoint/2012/main"/>
+    </p:ext>
+  </p:extLst>
 </p:presentation>
 </file>
 
@@ -257,7 +269,7 @@
           <a:p>
             <a:fld id="{1EFCC690-7CBF-47E6-BE6E-0EC1C9E624CE}" type="datetimeFigureOut">
               <a:rPr lang="it-IT" smtClean="0"/>
-              <a:t>01/05/2023</a:t>
+              <a:t>02/05/2023</a:t>
             </a:fld>
             <a:endParaRPr lang="it-IT"/>
           </a:p>
@@ -457,7 +469,7 @@
           <a:p>
             <a:fld id="{1EFCC690-7CBF-47E6-BE6E-0EC1C9E624CE}" type="datetimeFigureOut">
               <a:rPr lang="it-IT" smtClean="0"/>
-              <a:t>01/05/2023</a:t>
+              <a:t>02/05/2023</a:t>
             </a:fld>
             <a:endParaRPr lang="it-IT"/>
           </a:p>
@@ -667,7 +679,7 @@
           <a:p>
             <a:fld id="{1EFCC690-7CBF-47E6-BE6E-0EC1C9E624CE}" type="datetimeFigureOut">
               <a:rPr lang="it-IT" smtClean="0"/>
-              <a:t>01/05/2023</a:t>
+              <a:t>02/05/2023</a:t>
             </a:fld>
             <a:endParaRPr lang="it-IT"/>
           </a:p>
@@ -867,7 +879,7 @@
           <a:p>
             <a:fld id="{1EFCC690-7CBF-47E6-BE6E-0EC1C9E624CE}" type="datetimeFigureOut">
               <a:rPr lang="it-IT" smtClean="0"/>
-              <a:t>01/05/2023</a:t>
+              <a:t>02/05/2023</a:t>
             </a:fld>
             <a:endParaRPr lang="it-IT"/>
           </a:p>
@@ -1143,7 +1155,7 @@
           <a:p>
             <a:fld id="{1EFCC690-7CBF-47E6-BE6E-0EC1C9E624CE}" type="datetimeFigureOut">
               <a:rPr lang="it-IT" smtClean="0"/>
-              <a:t>01/05/2023</a:t>
+              <a:t>02/05/2023</a:t>
             </a:fld>
             <a:endParaRPr lang="it-IT"/>
           </a:p>
@@ -1411,7 +1423,7 @@
           <a:p>
             <a:fld id="{1EFCC690-7CBF-47E6-BE6E-0EC1C9E624CE}" type="datetimeFigureOut">
               <a:rPr lang="it-IT" smtClean="0"/>
-              <a:t>01/05/2023</a:t>
+              <a:t>02/05/2023</a:t>
             </a:fld>
             <a:endParaRPr lang="it-IT"/>
           </a:p>
@@ -1826,7 +1838,7 @@
           <a:p>
             <a:fld id="{1EFCC690-7CBF-47E6-BE6E-0EC1C9E624CE}" type="datetimeFigureOut">
               <a:rPr lang="it-IT" smtClean="0"/>
-              <a:t>01/05/2023</a:t>
+              <a:t>02/05/2023</a:t>
             </a:fld>
             <a:endParaRPr lang="it-IT"/>
           </a:p>
@@ -1968,7 +1980,7 @@
           <a:p>
             <a:fld id="{1EFCC690-7CBF-47E6-BE6E-0EC1C9E624CE}" type="datetimeFigureOut">
               <a:rPr lang="it-IT" smtClean="0"/>
-              <a:t>01/05/2023</a:t>
+              <a:t>02/05/2023</a:t>
             </a:fld>
             <a:endParaRPr lang="it-IT"/>
           </a:p>
@@ -2081,7 +2093,7 @@
           <a:p>
             <a:fld id="{1EFCC690-7CBF-47E6-BE6E-0EC1C9E624CE}" type="datetimeFigureOut">
               <a:rPr lang="it-IT" smtClean="0"/>
-              <a:t>01/05/2023</a:t>
+              <a:t>02/05/2023</a:t>
             </a:fld>
             <a:endParaRPr lang="it-IT"/>
           </a:p>
@@ -2394,7 +2406,7 @@
           <a:p>
             <a:fld id="{1EFCC690-7CBF-47E6-BE6E-0EC1C9E624CE}" type="datetimeFigureOut">
               <a:rPr lang="it-IT" smtClean="0"/>
-              <a:t>01/05/2023</a:t>
+              <a:t>02/05/2023</a:t>
             </a:fld>
             <a:endParaRPr lang="it-IT"/>
           </a:p>
@@ -2683,7 +2695,7 @@
           <a:p>
             <a:fld id="{1EFCC690-7CBF-47E6-BE6E-0EC1C9E624CE}" type="datetimeFigureOut">
               <a:rPr lang="it-IT" smtClean="0"/>
-              <a:t>01/05/2023</a:t>
+              <a:t>02/05/2023</a:t>
             </a:fld>
             <a:endParaRPr lang="it-IT"/>
           </a:p>
@@ -2926,7 +2938,7 @@
           <a:p>
             <a:fld id="{1EFCC690-7CBF-47E6-BE6E-0EC1C9E624CE}" type="datetimeFigureOut">
               <a:rPr lang="it-IT" smtClean="0"/>
-              <a:t>01/05/2023</a:t>
+              <a:t>02/05/2023</a:t>
             </a:fld>
             <a:endParaRPr lang="it-IT"/>
           </a:p>
@@ -3883,11 +3895,7 @@
             <a:pPr algn="ctr"/>
             <a:r>
               <a:rPr lang="en-US" dirty="0"/>
-              <a:t>I Due </a:t>
-            </a:r>
-            <a:r>
-              <a:rPr lang="en-US" dirty="0" err="1"/>
-              <a:t>Moschettieri</a:t>
+              <a:t>Il Team</a:t>
             </a:r>
             <a:endParaRPr lang="it-IT" dirty="0"/>
           </a:p>
@@ -3895,21 +3903,108 @@
       </p:sp>
       <p:sp>
         <p:nvSpPr>
-          <p:cNvPr id="3" name="Content Placeholder 2">
-            <a:extLst>
-              <a:ext uri="{FF2B5EF4-FFF2-40B4-BE49-F238E27FC236}">
-                <a16:creationId xmlns:a16="http://schemas.microsoft.com/office/drawing/2014/main" id="{5CE67D6A-F4D3-523C-96FF-3D513D3801EA}"/>
-              </a:ext>
-            </a:extLst>
-          </p:cNvPr>
-          <p:cNvSpPr>
-            <a:spLocks noGrp="1"/>
-          </p:cNvSpPr>
-          <p:nvPr>
-            <p:ph idx="1"/>
+          <p:cNvPr id="4" name="Text Placeholder 3">
+            <a:extLst>
+              <a:ext uri="{FF2B5EF4-FFF2-40B4-BE49-F238E27FC236}">
+                <a16:creationId xmlns:a16="http://schemas.microsoft.com/office/drawing/2014/main" id="{99CC7D97-599C-F575-0E3C-60F227AE19B7}"/>
+              </a:ext>
+            </a:extLst>
+          </p:cNvPr>
+          <p:cNvSpPr>
+            <a:spLocks noGrp="1"/>
+          </p:cNvSpPr>
+          <p:nvPr>
+            <p:ph type="body" idx="1"/>
+          </p:nvPr>
+        </p:nvSpPr>
+        <p:spPr>
+          <a:xfrm>
+            <a:off x="862014" y="5365751"/>
+            <a:ext cx="5157787" cy="823912"/>
+          </a:xfrm>
+        </p:spPr>
+        <p:txBody>
+          <a:bodyPr anchor="ctr"/>
+          <a:lstStyle/>
+          <a:p>
+            <a:pPr algn="ctr"/>
+            <a:endParaRPr lang="it-IT" dirty="0"/>
+          </a:p>
+        </p:txBody>
+      </p:sp>
+      <p:sp>
+        <p:nvSpPr>
+          <p:cNvPr id="6" name="Text Placeholder 5">
+            <a:extLst>
+              <a:ext uri="{FF2B5EF4-FFF2-40B4-BE49-F238E27FC236}">
+                <a16:creationId xmlns:a16="http://schemas.microsoft.com/office/drawing/2014/main" id="{533D7DF9-1F71-9766-ED1E-3700E9CEB5E9}"/>
+              </a:ext>
+            </a:extLst>
+          </p:cNvPr>
+          <p:cNvSpPr>
+            <a:spLocks noGrp="1"/>
+          </p:cNvSpPr>
+          <p:nvPr>
+            <p:ph type="body" sz="quarter" idx="3"/>
           </p:nvPr>
         </p:nvSpPr>
         <p:spPr/>
+        <p:txBody>
+          <a:bodyPr anchor="ctr"/>
+          <a:lstStyle/>
+          <a:p>
+            <a:pPr algn="ctr"/>
+            <a:endParaRPr lang="it-IT" dirty="0"/>
+          </a:p>
+        </p:txBody>
+      </p:sp>
+      <p:sp>
+        <p:nvSpPr>
+          <p:cNvPr id="7" name="Content Placeholder 6">
+            <a:extLst>
+              <a:ext uri="{FF2B5EF4-FFF2-40B4-BE49-F238E27FC236}">
+                <a16:creationId xmlns:a16="http://schemas.microsoft.com/office/drawing/2014/main" id="{8DEEBC6B-9DCB-FA44-5F4B-BB6C2DAC9E14}"/>
+              </a:ext>
+            </a:extLst>
+          </p:cNvPr>
+          <p:cNvSpPr>
+            <a:spLocks noGrp="1"/>
+          </p:cNvSpPr>
+          <p:nvPr>
+            <p:ph sz="quarter" idx="4"/>
+          </p:nvPr>
+        </p:nvSpPr>
+        <p:spPr/>
+        <p:txBody>
+          <a:bodyPr/>
+          <a:lstStyle/>
+          <a:p>
+            <a:endParaRPr lang="it-IT"/>
+          </a:p>
+        </p:txBody>
+      </p:sp>
+      <p:sp>
+        <p:nvSpPr>
+          <p:cNvPr id="3" name="Content Placeholder 4">
+            <a:extLst>
+              <a:ext uri="{FF2B5EF4-FFF2-40B4-BE49-F238E27FC236}">
+                <a16:creationId xmlns:a16="http://schemas.microsoft.com/office/drawing/2014/main" id="{449A74CB-ED56-DAB9-2BEF-CE51D092F63D}"/>
+              </a:ext>
+            </a:extLst>
+          </p:cNvPr>
+          <p:cNvSpPr>
+            <a:spLocks noGrp="1"/>
+          </p:cNvSpPr>
+          <p:nvPr>
+            <p:ph sz="half" idx="2"/>
+          </p:nvPr>
+        </p:nvSpPr>
+        <p:spPr>
+          <a:xfrm>
+            <a:off x="862014" y="1690688"/>
+            <a:ext cx="5157787" cy="3684588"/>
+          </a:xfrm>
+        </p:spPr>
         <p:txBody>
           <a:bodyPr/>
           <a:lstStyle/>
@@ -3922,6 +4017,1779 @@
     <p:extLst>
       <p:ext uri="{BB962C8B-B14F-4D97-AF65-F5344CB8AC3E}">
         <p14:creationId xmlns:p14="http://schemas.microsoft.com/office/powerpoint/2010/main" val="3498981795"/>
+      </p:ext>
+    </p:extLst>
+  </p:cSld>
+  <p:clrMapOvr>
+    <a:masterClrMapping/>
+  </p:clrMapOvr>
+</p:sld>
+</file>
+
+<file path=ppt/slides/slide3.xml><?xml version="1.0" encoding="utf-8"?>
+<p:sld xmlns:a="http://schemas.openxmlformats.org/drawingml/2006/main" xmlns:r="http://schemas.openxmlformats.org/officeDocument/2006/relationships" xmlns:p="http://schemas.openxmlformats.org/presentationml/2006/main">
+  <p:cSld>
+    <p:spTree>
+      <p:nvGrpSpPr>
+        <p:cNvPr id="1" name=""/>
+        <p:cNvGrpSpPr/>
+        <p:nvPr/>
+      </p:nvGrpSpPr>
+      <p:grpSpPr>
+        <a:xfrm>
+          <a:off x="0" y="0"/>
+          <a:ext cx="0" cy="0"/>
+          <a:chOff x="0" y="0"/>
+          <a:chExt cx="0" cy="0"/>
+        </a:xfrm>
+      </p:grpSpPr>
+      <p:sp>
+        <p:nvSpPr>
+          <p:cNvPr id="7" name="Title 6">
+            <a:extLst>
+              <a:ext uri="{FF2B5EF4-FFF2-40B4-BE49-F238E27FC236}">
+                <a16:creationId xmlns:a16="http://schemas.microsoft.com/office/drawing/2014/main" id="{1274AD00-1705-79BB-E305-6794E337D3E9}"/>
+              </a:ext>
+            </a:extLst>
+          </p:cNvPr>
+          <p:cNvSpPr>
+            <a:spLocks noGrp="1"/>
+          </p:cNvSpPr>
+          <p:nvPr>
+            <p:ph type="title"/>
+          </p:nvPr>
+        </p:nvSpPr>
+        <p:spPr/>
+        <p:txBody>
+          <a:bodyPr/>
+          <a:lstStyle/>
+          <a:p>
+            <a:pPr algn="ctr"/>
+            <a:r>
+              <a:rPr lang="en-US" dirty="0" err="1"/>
+              <a:t>Sommario</a:t>
+            </a:r>
+            <a:r>
+              <a:rPr lang="en-US" dirty="0"/>
+              <a:t> (</a:t>
+            </a:r>
+            <a:r>
+              <a:rPr lang="en-US" dirty="0" err="1"/>
+              <a:t>grafico</a:t>
+            </a:r>
+            <a:r>
+              <a:rPr lang="en-US" dirty="0"/>
+              <a:t>…)</a:t>
+            </a:r>
+            <a:endParaRPr lang="it-IT" dirty="0"/>
+          </a:p>
+        </p:txBody>
+      </p:sp>
+      <p:sp>
+        <p:nvSpPr>
+          <p:cNvPr id="8" name="Content Placeholder 7">
+            <a:extLst>
+              <a:ext uri="{FF2B5EF4-FFF2-40B4-BE49-F238E27FC236}">
+                <a16:creationId xmlns:a16="http://schemas.microsoft.com/office/drawing/2014/main" id="{4FC9FB4E-8DB8-4DA4-5B81-9DAF7A40AE3A}"/>
+              </a:ext>
+            </a:extLst>
+          </p:cNvPr>
+          <p:cNvSpPr>
+            <a:spLocks noGrp="1"/>
+          </p:cNvSpPr>
+          <p:nvPr>
+            <p:ph idx="1"/>
+          </p:nvPr>
+        </p:nvSpPr>
+        <p:spPr/>
+        <p:txBody>
+          <a:bodyPr/>
+          <a:lstStyle/>
+          <a:p>
+            <a:r>
+              <a:rPr lang="en-US" dirty="0" err="1"/>
+              <a:t>Presentazione</a:t>
+            </a:r>
+            <a:endParaRPr lang="en-US" dirty="0"/>
+          </a:p>
+          <a:p>
+            <a:r>
+              <a:rPr lang="en-US" dirty="0"/>
+              <a:t>Governance</a:t>
+            </a:r>
+          </a:p>
+          <a:p>
+            <a:r>
+              <a:rPr lang="en-US" dirty="0"/>
+              <a:t>Report</a:t>
+            </a:r>
+          </a:p>
+          <a:p>
+            <a:r>
+              <a:rPr lang="en-US" dirty="0"/>
+              <a:t>Business Model</a:t>
+            </a:r>
+          </a:p>
+          <a:p>
+            <a:r>
+              <a:rPr lang="en-US" dirty="0" err="1"/>
+              <a:t>Riferimenti</a:t>
+            </a:r>
+            <a:r>
+              <a:rPr lang="en-US" dirty="0"/>
+              <a:t> </a:t>
+            </a:r>
+            <a:r>
+              <a:rPr lang="en-US" dirty="0" err="1"/>
+              <a:t>Bibliografici</a:t>
+            </a:r>
+            <a:r>
+              <a:rPr lang="en-US" dirty="0"/>
+              <a:t>/</a:t>
+            </a:r>
+            <a:r>
+              <a:rPr lang="en-US" dirty="0" err="1"/>
+              <a:t>Sitografici</a:t>
+            </a:r>
+            <a:endParaRPr lang="it-IT" dirty="0"/>
+          </a:p>
+        </p:txBody>
+      </p:sp>
+    </p:spTree>
+    <p:extLst>
+      <p:ext uri="{BB962C8B-B14F-4D97-AF65-F5344CB8AC3E}">
+        <p14:creationId xmlns:p14="http://schemas.microsoft.com/office/powerpoint/2010/main" val="1422781813"/>
+      </p:ext>
+    </p:extLst>
+  </p:cSld>
+  <p:clrMapOvr>
+    <a:masterClrMapping/>
+  </p:clrMapOvr>
+</p:sld>
+</file>
+
+<file path=ppt/slides/slide4.xml><?xml version="1.0" encoding="utf-8"?>
+<p:sld xmlns:a="http://schemas.openxmlformats.org/drawingml/2006/main" xmlns:r="http://schemas.openxmlformats.org/officeDocument/2006/relationships" xmlns:p="http://schemas.openxmlformats.org/presentationml/2006/main">
+  <p:cSld>
+    <p:spTree>
+      <p:nvGrpSpPr>
+        <p:cNvPr id="1" name=""/>
+        <p:cNvGrpSpPr/>
+        <p:nvPr/>
+      </p:nvGrpSpPr>
+      <p:grpSpPr>
+        <a:xfrm>
+          <a:off x="0" y="0"/>
+          <a:ext cx="0" cy="0"/>
+          <a:chOff x="0" y="0"/>
+          <a:chExt cx="0" cy="0"/>
+        </a:xfrm>
+      </p:grpSpPr>
+      <p:sp>
+        <p:nvSpPr>
+          <p:cNvPr id="2" name="Title 1">
+            <a:extLst>
+              <a:ext uri="{FF2B5EF4-FFF2-40B4-BE49-F238E27FC236}">
+                <a16:creationId xmlns:a16="http://schemas.microsoft.com/office/drawing/2014/main" id="{39803B6E-6B1C-1D02-0D04-72184390FEF4}"/>
+              </a:ext>
+            </a:extLst>
+          </p:cNvPr>
+          <p:cNvSpPr>
+            <a:spLocks noGrp="1"/>
+          </p:cNvSpPr>
+          <p:nvPr>
+            <p:ph type="title"/>
+          </p:nvPr>
+        </p:nvSpPr>
+        <p:spPr>
+          <a:xfrm>
+            <a:off x="839788" y="457200"/>
+            <a:ext cx="3932237" cy="748145"/>
+          </a:xfrm>
+        </p:spPr>
+        <p:txBody>
+          <a:bodyPr anchor="ctr"/>
+          <a:lstStyle/>
+          <a:p>
+            <a:pPr algn="ctr"/>
+            <a:r>
+              <a:rPr lang="en-US" dirty="0" err="1"/>
+              <a:t>Piccola</a:t>
+            </a:r>
+            <a:r>
+              <a:rPr lang="en-US" dirty="0"/>
+              <a:t> </a:t>
+            </a:r>
+            <a:r>
+              <a:rPr lang="en-US" dirty="0" err="1"/>
+              <a:t>Presentazione</a:t>
+            </a:r>
+            <a:endParaRPr lang="it-IT" dirty="0"/>
+          </a:p>
+        </p:txBody>
+      </p:sp>
+      <p:pic>
+        <p:nvPicPr>
+          <p:cNvPr id="6" name="Content Placeholder 5">
+            <a:extLst>
+              <a:ext uri="{FF2B5EF4-FFF2-40B4-BE49-F238E27FC236}">
+                <a16:creationId xmlns:a16="http://schemas.microsoft.com/office/drawing/2014/main" id="{F9940ACE-D8E3-03DF-03DE-CB90EEFA8B10}"/>
+              </a:ext>
+            </a:extLst>
+          </p:cNvPr>
+          <p:cNvPicPr>
+            <a:picLocks noGrp="1" noChangeAspect="1"/>
+          </p:cNvPicPr>
+          <p:nvPr>
+            <p:ph idx="1"/>
+          </p:nvPr>
+        </p:nvPicPr>
+        <p:blipFill>
+          <a:blip r:embed="rId2">
+            <a:extLst>
+              <a:ext uri="{28A0092B-C50C-407E-A947-70E740481C1C}">
+                <a14:useLocalDpi xmlns:a14="http://schemas.microsoft.com/office/drawing/2010/main" val="0"/>
+              </a:ext>
+              <a:ext uri="{96DAC541-7B7A-43D3-8B79-37D633B846F1}">
+                <asvg:svgBlip xmlns:asvg="http://schemas.microsoft.com/office/drawing/2016/SVG/main" r:embed="rId3"/>
+              </a:ext>
+            </a:extLst>
+          </a:blip>
+          <a:stretch>
+            <a:fillRect/>
+          </a:stretch>
+        </p:blipFill>
+        <p:spPr>
+          <a:xfrm>
+            <a:off x="6292735" y="1205345"/>
+            <a:ext cx="5059477" cy="1445565"/>
+          </a:xfrm>
+        </p:spPr>
+      </p:pic>
+      <p:sp>
+        <p:nvSpPr>
+          <p:cNvPr id="4" name="Text Placeholder 3">
+            <a:extLst>
+              <a:ext uri="{FF2B5EF4-FFF2-40B4-BE49-F238E27FC236}">
+                <a16:creationId xmlns:a16="http://schemas.microsoft.com/office/drawing/2014/main" id="{64CDF323-AEC0-01BC-2794-E0C48488A2E7}"/>
+              </a:ext>
+            </a:extLst>
+          </p:cNvPr>
+          <p:cNvSpPr>
+            <a:spLocks noGrp="1"/>
+          </p:cNvSpPr>
+          <p:nvPr>
+            <p:ph type="body" sz="half" idx="2"/>
+          </p:nvPr>
+        </p:nvSpPr>
+        <p:spPr>
+          <a:xfrm>
+            <a:off x="839788" y="1205345"/>
+            <a:ext cx="5059477" cy="5370022"/>
+          </a:xfrm>
+        </p:spPr>
+        <p:txBody>
+          <a:bodyPr>
+            <a:normAutofit fontScale="85000" lnSpcReduction="20000"/>
+          </a:bodyPr>
+          <a:lstStyle/>
+          <a:p>
+            <a:r>
+              <a:rPr lang="en-US" dirty="0" err="1"/>
+              <a:t>Descrizione</a:t>
+            </a:r>
+            <a:r>
+              <a:rPr lang="en-US" dirty="0"/>
+              <a:t>: </a:t>
+            </a:r>
+            <a:r>
+              <a:rPr lang="en-US" dirty="0" err="1"/>
+              <a:t>Elica</a:t>
+            </a:r>
+            <a:r>
+              <a:rPr lang="en-US" dirty="0"/>
+              <a:t> S.p.A.</a:t>
+            </a:r>
+            <a:r>
+              <a:rPr lang="it-IT" dirty="0"/>
+              <a:t>, leader mondiale dei sistemi di aspirazione in cucina.</a:t>
+            </a:r>
+          </a:p>
+          <a:p>
+            <a:r>
+              <a:rPr lang="it-IT" dirty="0"/>
+              <a:t>Localizzazione: </a:t>
+            </a:r>
+          </a:p>
+          <a:p>
+            <a:pPr marL="342900" indent="-342900">
+              <a:buFont typeface="+mj-lt"/>
+              <a:buAutoNum type="arabicPeriod"/>
+            </a:pPr>
+            <a:r>
+              <a:rPr lang="it-IT" b="1" i="0" dirty="0">
+                <a:solidFill>
+                  <a:srgbClr val="666666"/>
+                </a:solidFill>
+                <a:effectLst/>
+                <a:latin typeface="Gotham"/>
+              </a:rPr>
+              <a:t>ELICA S.P.A.</a:t>
+            </a:r>
+            <a:br>
+              <a:rPr lang="it-IT" dirty="0"/>
+            </a:br>
+            <a:r>
+              <a:rPr lang="it-IT" b="0" i="0" dirty="0">
+                <a:solidFill>
+                  <a:srgbClr val="666666"/>
+                </a:solidFill>
+                <a:effectLst/>
+                <a:latin typeface="Gotham"/>
+              </a:rPr>
+              <a:t>60044 Fabriano</a:t>
+            </a:r>
+            <a:br>
+              <a:rPr lang="it-IT" dirty="0"/>
+            </a:br>
+            <a:r>
+              <a:rPr lang="it-IT" b="0" i="0" dirty="0">
+                <a:solidFill>
+                  <a:srgbClr val="666666"/>
+                </a:solidFill>
+                <a:effectLst/>
+                <a:latin typeface="Gotham"/>
+              </a:rPr>
+              <a:t>Mergo - Cerreto</a:t>
+            </a:r>
+            <a:br>
+              <a:rPr lang="it-IT" dirty="0"/>
+            </a:br>
+            <a:r>
+              <a:rPr lang="it-IT" b="0" i="0" dirty="0">
+                <a:solidFill>
+                  <a:srgbClr val="666666"/>
+                </a:solidFill>
+                <a:effectLst/>
+                <a:latin typeface="Gotham"/>
+              </a:rPr>
+              <a:t>Via Ermanno Casoli, 2</a:t>
+            </a:r>
+            <a:br>
+              <a:rPr lang="it-IT" dirty="0"/>
+            </a:br>
+            <a:br>
+              <a:rPr lang="it-IT" dirty="0"/>
+            </a:br>
+            <a:r>
+              <a:rPr lang="it-IT" b="1" i="0" dirty="0">
+                <a:solidFill>
+                  <a:srgbClr val="666666"/>
+                </a:solidFill>
+                <a:effectLst/>
+                <a:latin typeface="Gotham"/>
+              </a:rPr>
+              <a:t>EMC FIME S.r.l.</a:t>
+            </a:r>
+            <a:br>
+              <a:rPr lang="it-IT" dirty="0"/>
+            </a:br>
+            <a:r>
+              <a:rPr lang="it-IT" b="0" i="0" dirty="0">
+                <a:solidFill>
+                  <a:srgbClr val="666666"/>
+                </a:solidFill>
+                <a:effectLst/>
+                <a:latin typeface="Gotham"/>
+              </a:rPr>
+              <a:t>Via Jesina 56</a:t>
+            </a:r>
+            <a:br>
+              <a:rPr lang="it-IT" dirty="0"/>
+            </a:br>
+            <a:r>
+              <a:rPr lang="it-IT" b="0" i="0" dirty="0">
+                <a:solidFill>
+                  <a:srgbClr val="666666"/>
+                </a:solidFill>
+                <a:effectLst/>
+                <a:latin typeface="Gotham"/>
+              </a:rPr>
+              <a:t>Castelfidardo (AN)</a:t>
+            </a:r>
+            <a:br>
+              <a:rPr lang="it-IT" dirty="0"/>
+            </a:br>
+            <a:br>
+              <a:rPr lang="it-IT" dirty="0"/>
+            </a:br>
+            <a:r>
+              <a:rPr lang="it-IT" b="1" i="0" dirty="0">
+                <a:solidFill>
+                  <a:srgbClr val="666666"/>
+                </a:solidFill>
+                <a:effectLst/>
+                <a:latin typeface="Gotham"/>
+              </a:rPr>
+              <a:t>AIR FORCE S.P.A.</a:t>
+            </a:r>
+            <a:br>
+              <a:rPr lang="it-IT" dirty="0"/>
+            </a:br>
+            <a:r>
+              <a:rPr lang="it-IT" b="0" i="0" dirty="0" err="1">
+                <a:solidFill>
+                  <a:srgbClr val="666666"/>
+                </a:solidFill>
+                <a:effectLst/>
+                <a:latin typeface="Gotham"/>
+              </a:rPr>
+              <a:t>Fraz</a:t>
+            </a:r>
+            <a:r>
+              <a:rPr lang="it-IT" b="0" i="0" dirty="0">
+                <a:solidFill>
+                  <a:srgbClr val="666666"/>
+                </a:solidFill>
+                <a:effectLst/>
+                <a:latin typeface="Gotham"/>
+              </a:rPr>
+              <a:t>. Ca' Maiano 140/E</a:t>
+            </a:r>
+            <a:br>
+              <a:rPr lang="it-IT" dirty="0"/>
+            </a:br>
+            <a:r>
+              <a:rPr lang="it-IT" b="0" i="0" dirty="0">
+                <a:solidFill>
+                  <a:srgbClr val="666666"/>
+                </a:solidFill>
+                <a:effectLst/>
+                <a:latin typeface="Gotham"/>
+              </a:rPr>
+              <a:t>60044 Fabriano (AN)</a:t>
+            </a:r>
+            <a:br>
+              <a:rPr lang="it-IT" dirty="0"/>
+            </a:br>
+            <a:r>
+              <a:rPr lang="it-IT" b="0" i="0" dirty="0">
+                <a:solidFill>
+                  <a:srgbClr val="666666"/>
+                </a:solidFill>
+                <a:effectLst/>
+                <a:latin typeface="Gotham"/>
+              </a:rPr>
+              <a:t>C.F. 01474440425</a:t>
+            </a:r>
+          </a:p>
+          <a:p>
+            <a:pPr marL="342900" indent="-342900">
+              <a:buFont typeface="+mj-lt"/>
+              <a:buAutoNum type="arabicPeriod"/>
+            </a:pPr>
+            <a:r>
+              <a:rPr lang="it-IT" b="1" i="0" dirty="0">
+                <a:solidFill>
+                  <a:srgbClr val="666666"/>
+                </a:solidFill>
+                <a:effectLst/>
+                <a:latin typeface="Gotham"/>
+              </a:rPr>
+              <a:t>ELICAMEX S.A. DE C.V.</a:t>
+            </a:r>
+            <a:br>
+              <a:rPr lang="it-IT" dirty="0"/>
+            </a:br>
+            <a:r>
+              <a:rPr lang="it-IT" b="0" i="0" dirty="0">
+                <a:effectLst/>
+                <a:latin typeface="Gotham"/>
+              </a:rPr>
+              <a:t>Controllata 100% (direttamente 98%, indirettamente 2% EGP)</a:t>
+            </a:r>
+            <a:br>
+              <a:rPr lang="it-IT" dirty="0"/>
+            </a:br>
+            <a:r>
+              <a:rPr lang="it-IT" b="0" i="0" dirty="0">
+                <a:solidFill>
+                  <a:srgbClr val="666666"/>
+                </a:solidFill>
+                <a:effectLst/>
+                <a:latin typeface="Gotham"/>
+              </a:rPr>
+              <a:t>Avenida la Noria (</a:t>
+            </a:r>
+            <a:r>
+              <a:rPr lang="it-IT" b="0" i="0" dirty="0" err="1">
+                <a:solidFill>
+                  <a:srgbClr val="666666"/>
+                </a:solidFill>
+                <a:effectLst/>
+                <a:latin typeface="Gotham"/>
+              </a:rPr>
+              <a:t>Prolongación</a:t>
+            </a:r>
+            <a:r>
+              <a:rPr lang="it-IT" b="0" i="0" dirty="0">
+                <a:solidFill>
+                  <a:srgbClr val="666666"/>
+                </a:solidFill>
+                <a:effectLst/>
+                <a:latin typeface="Gotham"/>
+              </a:rPr>
+              <a:t>) 102, </a:t>
+            </a:r>
+            <a:r>
+              <a:rPr lang="it-IT" b="0" i="0" dirty="0" err="1">
+                <a:solidFill>
+                  <a:srgbClr val="666666"/>
+                </a:solidFill>
+                <a:effectLst/>
+                <a:latin typeface="Gotham"/>
+              </a:rPr>
+              <a:t>Ampliación</a:t>
+            </a:r>
+            <a:r>
+              <a:rPr lang="it-IT" b="0" i="0" dirty="0">
+                <a:solidFill>
+                  <a:srgbClr val="666666"/>
+                </a:solidFill>
+                <a:effectLst/>
+                <a:latin typeface="Gotham"/>
+              </a:rPr>
+              <a:t> </a:t>
+            </a:r>
+            <a:r>
+              <a:rPr lang="it-IT" b="0" i="0" dirty="0" err="1">
+                <a:solidFill>
+                  <a:srgbClr val="666666"/>
+                </a:solidFill>
+                <a:effectLst/>
+                <a:latin typeface="Gotham"/>
+              </a:rPr>
+              <a:t>Parque</a:t>
+            </a:r>
+            <a:r>
+              <a:rPr lang="it-IT" b="0" i="0" dirty="0">
+                <a:solidFill>
+                  <a:srgbClr val="666666"/>
+                </a:solidFill>
+                <a:effectLst/>
+                <a:latin typeface="Gotham"/>
+              </a:rPr>
+              <a:t> Industrial Querétaro,</a:t>
+            </a:r>
+            <a:br>
+              <a:rPr lang="it-IT" dirty="0"/>
+            </a:br>
+            <a:r>
+              <a:rPr lang="it-IT" b="0" i="0" dirty="0">
+                <a:solidFill>
+                  <a:srgbClr val="666666"/>
+                </a:solidFill>
+                <a:effectLst/>
+                <a:latin typeface="Gotham"/>
+              </a:rPr>
+              <a:t>Querétaro, Cp 76215</a:t>
+            </a:r>
+            <a:br>
+              <a:rPr lang="it-IT" dirty="0"/>
+            </a:br>
+            <a:r>
+              <a:rPr lang="it-IT" b="0" i="0" dirty="0">
+                <a:solidFill>
+                  <a:srgbClr val="666666"/>
+                </a:solidFill>
+                <a:effectLst/>
+                <a:latin typeface="Gotham"/>
+              </a:rPr>
+              <a:t>C.F. ELI060102RK8</a:t>
+            </a:r>
+          </a:p>
+          <a:p>
+            <a:pPr marL="342900" indent="-342900">
+              <a:buFont typeface="+mj-lt"/>
+              <a:buAutoNum type="arabicPeriod"/>
+            </a:pPr>
+            <a:r>
+              <a:rPr lang="it-IT" b="1" i="0" dirty="0">
+                <a:solidFill>
+                  <a:srgbClr val="666666"/>
+                </a:solidFill>
+                <a:effectLst/>
+                <a:latin typeface="Gotham"/>
+              </a:rPr>
+              <a:t>ELICA GROUP POLSKA SP.Z.O.O</a:t>
+            </a:r>
+            <a:br>
+              <a:rPr lang="it-IT" dirty="0"/>
+            </a:br>
+            <a:r>
+              <a:rPr lang="it-IT" b="0" i="0" dirty="0">
+                <a:effectLst/>
+                <a:latin typeface="Gotham"/>
+              </a:rPr>
+              <a:t>Controllata 100%</a:t>
+            </a:r>
+            <a:br>
+              <a:rPr lang="it-IT" dirty="0"/>
+            </a:br>
+            <a:r>
+              <a:rPr lang="it-IT" b="0" i="0" dirty="0" err="1">
+                <a:solidFill>
+                  <a:srgbClr val="666666"/>
+                </a:solidFill>
+                <a:effectLst/>
+                <a:latin typeface="Gotham"/>
+              </a:rPr>
+              <a:t>ul</a:t>
+            </a:r>
+            <a:r>
+              <a:rPr lang="it-IT" b="0" i="0" dirty="0">
+                <a:solidFill>
+                  <a:srgbClr val="666666"/>
+                </a:solidFill>
+                <a:effectLst/>
+                <a:latin typeface="Gotham"/>
+              </a:rPr>
+              <a:t>. </a:t>
+            </a:r>
+            <a:r>
+              <a:rPr lang="it-IT" b="0" i="0" dirty="0" err="1">
+                <a:solidFill>
+                  <a:srgbClr val="666666"/>
+                </a:solidFill>
+                <a:effectLst/>
+                <a:latin typeface="Gotham"/>
+              </a:rPr>
+              <a:t>Inzynierska</a:t>
+            </a:r>
+            <a:r>
+              <a:rPr lang="it-IT" b="0" i="0" dirty="0">
+                <a:solidFill>
+                  <a:srgbClr val="666666"/>
+                </a:solidFill>
+                <a:effectLst/>
+                <a:latin typeface="Gotham"/>
+              </a:rPr>
+              <a:t> 3, 55-221</a:t>
+            </a:r>
+            <a:br>
+              <a:rPr lang="it-IT" dirty="0"/>
+            </a:br>
+            <a:r>
+              <a:rPr lang="it-IT" b="0" i="0" dirty="0" err="1">
+                <a:solidFill>
+                  <a:srgbClr val="666666"/>
+                </a:solidFill>
+                <a:effectLst/>
+                <a:latin typeface="Gotham"/>
+              </a:rPr>
+              <a:t>Jelcz</a:t>
+            </a:r>
+            <a:r>
+              <a:rPr lang="it-IT" b="0" i="0" dirty="0">
+                <a:solidFill>
+                  <a:srgbClr val="666666"/>
+                </a:solidFill>
+                <a:effectLst/>
+                <a:latin typeface="Gotham"/>
+              </a:rPr>
+              <a:t> </a:t>
+            </a:r>
+            <a:r>
+              <a:rPr lang="it-IT" b="0" i="0" dirty="0" err="1">
+                <a:solidFill>
+                  <a:srgbClr val="666666"/>
+                </a:solidFill>
+                <a:effectLst/>
+                <a:latin typeface="Gotham"/>
+              </a:rPr>
+              <a:t>Laskowice</a:t>
+            </a:r>
+            <a:br>
+              <a:rPr lang="it-IT" dirty="0"/>
+            </a:br>
+            <a:r>
+              <a:rPr lang="it-IT" b="0" i="0" dirty="0">
+                <a:solidFill>
+                  <a:srgbClr val="666666"/>
+                </a:solidFill>
+                <a:effectLst/>
+                <a:latin typeface="Gotham"/>
+              </a:rPr>
+              <a:t>53-017 Wroclaw</a:t>
+            </a:r>
+          </a:p>
+          <a:p>
+            <a:pPr marL="342900" indent="-342900">
+              <a:buFont typeface="+mj-lt"/>
+              <a:buAutoNum type="arabicPeriod"/>
+            </a:pPr>
+            <a:r>
+              <a:rPr lang="it-IT" b="1" i="0" dirty="0">
+                <a:solidFill>
+                  <a:srgbClr val="666666"/>
+                </a:solidFill>
+                <a:effectLst/>
+                <a:latin typeface="Gotham"/>
+              </a:rPr>
+              <a:t>ZHEJIANG ELICA PUTIAN ELECTRIC CO., LTD</a:t>
+            </a:r>
+            <a:br>
+              <a:rPr lang="it-IT" dirty="0"/>
+            </a:br>
+            <a:r>
+              <a:rPr lang="it-IT" b="0" i="0" dirty="0">
+                <a:effectLst/>
+                <a:latin typeface="Gotham"/>
+              </a:rPr>
+              <a:t>Controllata 99%</a:t>
+            </a:r>
+            <a:br>
+              <a:rPr lang="it-IT" dirty="0"/>
+            </a:br>
+            <a:r>
+              <a:rPr lang="it-IT" b="0" i="0" dirty="0">
+                <a:solidFill>
+                  <a:srgbClr val="666666"/>
+                </a:solidFill>
+                <a:effectLst/>
+                <a:latin typeface="Gotham"/>
+              </a:rPr>
+              <a:t>No.88 </a:t>
+            </a:r>
+            <a:r>
+              <a:rPr lang="it-IT" b="0" i="0" dirty="0" err="1">
+                <a:solidFill>
+                  <a:srgbClr val="666666"/>
+                </a:solidFill>
+                <a:effectLst/>
+                <a:latin typeface="Gotham"/>
+              </a:rPr>
+              <a:t>Putian</a:t>
+            </a:r>
+            <a:r>
+              <a:rPr lang="it-IT" b="0" i="0" dirty="0">
+                <a:solidFill>
+                  <a:srgbClr val="666666"/>
+                </a:solidFill>
+                <a:effectLst/>
+                <a:latin typeface="Gotham"/>
+              </a:rPr>
+              <a:t> Avenue,</a:t>
+            </a:r>
+            <a:br>
+              <a:rPr lang="it-IT" dirty="0"/>
+            </a:br>
+            <a:r>
+              <a:rPr lang="it-IT" b="0" i="0" dirty="0" err="1">
+                <a:solidFill>
+                  <a:srgbClr val="666666"/>
+                </a:solidFill>
+                <a:effectLst/>
+                <a:latin typeface="Gotham"/>
+              </a:rPr>
+              <a:t>Shengzhou</a:t>
+            </a:r>
+            <a:r>
+              <a:rPr lang="it-IT" b="0" i="0" dirty="0">
+                <a:solidFill>
+                  <a:srgbClr val="666666"/>
+                </a:solidFill>
+                <a:effectLst/>
+                <a:latin typeface="Gotham"/>
+              </a:rPr>
+              <a:t>, Zhejiang</a:t>
+            </a:r>
+            <a:endParaRPr lang="en-US" dirty="0"/>
+          </a:p>
+        </p:txBody>
+      </p:sp>
+    </p:spTree>
+    <p:extLst>
+      <p:ext uri="{BB962C8B-B14F-4D97-AF65-F5344CB8AC3E}">
+        <p14:creationId xmlns:p14="http://schemas.microsoft.com/office/powerpoint/2010/main" val="3133664935"/>
+      </p:ext>
+    </p:extLst>
+  </p:cSld>
+  <p:clrMapOvr>
+    <a:masterClrMapping/>
+  </p:clrMapOvr>
+</p:sld>
+</file>
+
+<file path=ppt/slides/slide5.xml><?xml version="1.0" encoding="utf-8"?>
+<p:sld xmlns:a="http://schemas.openxmlformats.org/drawingml/2006/main" xmlns:r="http://schemas.openxmlformats.org/officeDocument/2006/relationships" xmlns:p="http://schemas.openxmlformats.org/presentationml/2006/main">
+  <p:cSld>
+    <p:spTree>
+      <p:nvGrpSpPr>
+        <p:cNvPr id="1" name=""/>
+        <p:cNvGrpSpPr/>
+        <p:nvPr/>
+      </p:nvGrpSpPr>
+      <p:grpSpPr>
+        <a:xfrm>
+          <a:off x="0" y="0"/>
+          <a:ext cx="0" cy="0"/>
+          <a:chOff x="0" y="0"/>
+          <a:chExt cx="0" cy="0"/>
+        </a:xfrm>
+      </p:grpSpPr>
+      <p:sp>
+        <p:nvSpPr>
+          <p:cNvPr id="2" name="Title 1">
+            <a:extLst>
+              <a:ext uri="{FF2B5EF4-FFF2-40B4-BE49-F238E27FC236}">
+                <a16:creationId xmlns:a16="http://schemas.microsoft.com/office/drawing/2014/main" id="{94BA3425-9764-B8CC-53A4-30D039D96780}"/>
+              </a:ext>
+            </a:extLst>
+          </p:cNvPr>
+          <p:cNvSpPr>
+            <a:spLocks noGrp="1"/>
+          </p:cNvSpPr>
+          <p:nvPr>
+            <p:ph type="title"/>
+          </p:nvPr>
+        </p:nvSpPr>
+        <p:spPr/>
+        <p:txBody>
+          <a:bodyPr/>
+          <a:lstStyle/>
+          <a:p>
+            <a:pPr algn="ctr"/>
+            <a:r>
+              <a:rPr lang="en-US" dirty="0"/>
+              <a:t>Storia</a:t>
+            </a:r>
+            <a:endParaRPr lang="it-IT" dirty="0"/>
+          </a:p>
+        </p:txBody>
+      </p:sp>
+      <p:sp>
+        <p:nvSpPr>
+          <p:cNvPr id="3" name="Content Placeholder 2">
+            <a:extLst>
+              <a:ext uri="{FF2B5EF4-FFF2-40B4-BE49-F238E27FC236}">
+                <a16:creationId xmlns:a16="http://schemas.microsoft.com/office/drawing/2014/main" id="{917C84D4-3B18-6714-704F-A080589C9758}"/>
+              </a:ext>
+            </a:extLst>
+          </p:cNvPr>
+          <p:cNvSpPr>
+            <a:spLocks noGrp="1"/>
+          </p:cNvSpPr>
+          <p:nvPr>
+            <p:ph idx="1"/>
+          </p:nvPr>
+        </p:nvSpPr>
+        <p:spPr>
+          <a:xfrm>
+            <a:off x="838200" y="1825625"/>
+            <a:ext cx="10515600" cy="4667250"/>
+          </a:xfrm>
+        </p:spPr>
+        <p:txBody>
+          <a:bodyPr>
+            <a:normAutofit lnSpcReduction="10000"/>
+          </a:bodyPr>
+          <a:lstStyle/>
+          <a:p>
+            <a:r>
+              <a:rPr lang="it-IT" sz="1400" dirty="0"/>
+              <a:t>1970 - fondata a Fabriano da Ermano Casoli, prima cappa elica</a:t>
+            </a:r>
+          </a:p>
+          <a:p>
+            <a:r>
+              <a:rPr lang="it-IT" sz="1400" dirty="0"/>
+              <a:t>1978 - morte di Ermano Casoli (49) succedono Francesco Casoli e la madre, Gianna Pieralisi</a:t>
+            </a:r>
+          </a:p>
+          <a:p>
+            <a:r>
+              <a:rPr lang="it-IT" sz="1400" dirty="0"/>
+              <a:t>1982 - cappa "lego", personalizzabile e rivoluzionaria</a:t>
+            </a:r>
+          </a:p>
+          <a:p>
+            <a:r>
+              <a:rPr lang="it-IT" sz="1400" dirty="0"/>
+              <a:t>1994 - Stabilimento a Serra San Quirico e laboratorio Elica</a:t>
+            </a:r>
+          </a:p>
+          <a:p>
+            <a:r>
+              <a:rPr lang="it-IT" sz="1400" dirty="0"/>
+              <a:t>1995 - incendio allo stabilimento di Fabriano, ricostruito in 4 mesi + tutti i dipendenti</a:t>
+            </a:r>
+          </a:p>
+          <a:p>
+            <a:r>
+              <a:rPr lang="it-IT" sz="1400" dirty="0"/>
+              <a:t>1999 - Intuizione: cappa come oggetto di design tecnologia suggestione e emozione, collaborazione con David Lewis</a:t>
+            </a:r>
+          </a:p>
+          <a:p>
+            <a:r>
+              <a:rPr lang="it-IT" sz="1400" dirty="0"/>
+              <a:t>2002 - In Giappone, Elica costituisce “</a:t>
+            </a:r>
+            <a:r>
+              <a:rPr lang="it-IT" sz="1400" dirty="0" err="1"/>
+              <a:t>Ariafina</a:t>
+            </a:r>
+            <a:r>
+              <a:rPr lang="it-IT" sz="1400" dirty="0"/>
+              <a:t> co. ltd”, una joint venture con “Fuji Industrial” - leader nipponico nella produzione di cappe aspiranti - con l’obiettivo di commer­cializzare nel mercato giapponese prodotti di elevato design.</a:t>
+            </a:r>
+          </a:p>
+          <a:p>
+            <a:r>
+              <a:rPr lang="it-IT" sz="1400" dirty="0"/>
+              <a:t>2004 - "Om" inserita </a:t>
+            </a:r>
+            <a:r>
+              <a:rPr lang="it-IT" sz="1400" dirty="0" err="1"/>
+              <a:t>nell'Adi</a:t>
+            </a:r>
+            <a:r>
+              <a:rPr lang="it-IT" sz="1400" dirty="0"/>
+              <a:t> Index, inizia la rivoluzione, successo globale</a:t>
+            </a:r>
+          </a:p>
+          <a:p>
+            <a:r>
+              <a:rPr lang="it-IT" sz="1400" dirty="0"/>
+              <a:t>2005 - da qui iniziano a espandersi in vari paesi extra-</a:t>
+            </a:r>
+            <a:r>
+              <a:rPr lang="it-IT" sz="1400" dirty="0" err="1"/>
+              <a:t>ue</a:t>
+            </a:r>
+            <a:endParaRPr lang="it-IT" sz="1400" dirty="0"/>
+          </a:p>
+          <a:p>
+            <a:r>
+              <a:rPr lang="it-IT" sz="1400" dirty="0"/>
+              <a:t>2006 – da novembre entra nel segmento star della borsa italiana</a:t>
+            </a:r>
+          </a:p>
+          <a:p>
+            <a:r>
+              <a:rPr lang="it-IT" sz="1400" dirty="0"/>
+              <a:t>2010 - Stefano Giovannoni -&gt; "</a:t>
+            </a:r>
+            <a:r>
+              <a:rPr lang="it-IT" sz="1400" dirty="0" err="1"/>
+              <a:t>Bubble</a:t>
+            </a:r>
+            <a:r>
+              <a:rPr lang="it-IT" sz="1400" dirty="0"/>
+              <a:t>" prima cappa con tecnopolimero. In India joint venture "Elica PB India Private ltd.". In Cina acquisisce "</a:t>
+            </a:r>
+            <a:r>
+              <a:rPr lang="it-IT" sz="1400" dirty="0" err="1"/>
+              <a:t>Zhejian</a:t>
+            </a:r>
+            <a:r>
+              <a:rPr lang="it-IT" sz="1400" dirty="0"/>
+              <a:t> </a:t>
+            </a:r>
+            <a:r>
+              <a:rPr lang="it-IT" sz="1400" dirty="0" err="1"/>
+              <a:t>Putian</a:t>
+            </a:r>
+            <a:r>
+              <a:rPr lang="it-IT" sz="1400" dirty="0"/>
+              <a:t> Electric co. Ltd</a:t>
+            </a:r>
+          </a:p>
+          <a:p>
+            <a:r>
+              <a:rPr lang="it-IT" sz="1400" dirty="0"/>
+              <a:t>2011 – da qui gli vengono assegnati numerosi premi tra cui nel 2018 il Premio compasso d’oro</a:t>
+            </a:r>
+          </a:p>
+          <a:p>
+            <a:r>
+              <a:rPr lang="it-IT" sz="1400" dirty="0"/>
+              <a:t>2016 - Snap lanciato nuovo air </a:t>
+            </a:r>
+            <a:r>
+              <a:rPr lang="it-IT" sz="1400" dirty="0" err="1"/>
+              <a:t>quality</a:t>
+            </a:r>
+            <a:r>
+              <a:rPr lang="it-IT" sz="1400" dirty="0"/>
+              <a:t> </a:t>
+            </a:r>
+            <a:r>
+              <a:rPr lang="it-IT" sz="1400" dirty="0" err="1"/>
+              <a:t>balancer</a:t>
+            </a:r>
+            <a:r>
+              <a:rPr lang="it-IT" sz="1400" dirty="0"/>
+              <a:t> -&gt; IoT</a:t>
+            </a:r>
+          </a:p>
+          <a:p>
+            <a:r>
+              <a:rPr lang="it-IT" sz="1400" dirty="0"/>
+              <a:t>2022 – nascita di EMC FIME</a:t>
+            </a:r>
+          </a:p>
+        </p:txBody>
+      </p:sp>
+    </p:spTree>
+    <p:extLst>
+      <p:ext uri="{BB962C8B-B14F-4D97-AF65-F5344CB8AC3E}">
+        <p14:creationId xmlns:p14="http://schemas.microsoft.com/office/powerpoint/2010/main" val="2900084327"/>
+      </p:ext>
+    </p:extLst>
+  </p:cSld>
+  <p:clrMapOvr>
+    <a:masterClrMapping/>
+  </p:clrMapOvr>
+</p:sld>
+</file>
+
+<file path=ppt/slides/slide6.xml><?xml version="1.0" encoding="utf-8"?>
+<p:sld xmlns:a="http://schemas.openxmlformats.org/drawingml/2006/main" xmlns:r="http://schemas.openxmlformats.org/officeDocument/2006/relationships" xmlns:p="http://schemas.openxmlformats.org/presentationml/2006/main">
+  <p:cSld>
+    <p:spTree>
+      <p:nvGrpSpPr>
+        <p:cNvPr id="1" name=""/>
+        <p:cNvGrpSpPr/>
+        <p:nvPr/>
+      </p:nvGrpSpPr>
+      <p:grpSpPr>
+        <a:xfrm>
+          <a:off x="0" y="0"/>
+          <a:ext cx="0" cy="0"/>
+          <a:chOff x="0" y="0"/>
+          <a:chExt cx="0" cy="0"/>
+        </a:xfrm>
+      </p:grpSpPr>
+      <p:sp>
+        <p:nvSpPr>
+          <p:cNvPr id="2" name="Title 1">
+            <a:extLst>
+              <a:ext uri="{FF2B5EF4-FFF2-40B4-BE49-F238E27FC236}">
+                <a16:creationId xmlns:a16="http://schemas.microsoft.com/office/drawing/2014/main" id="{C2ABF5A1-DC99-9CA1-B3A9-D6AD6EC919E7}"/>
+              </a:ext>
+            </a:extLst>
+          </p:cNvPr>
+          <p:cNvSpPr>
+            <a:spLocks noGrp="1"/>
+          </p:cNvSpPr>
+          <p:nvPr>
+            <p:ph type="title"/>
+          </p:nvPr>
+        </p:nvSpPr>
+        <p:spPr>
+          <a:xfrm>
+            <a:off x="838200" y="365126"/>
+            <a:ext cx="10515600" cy="715530"/>
+          </a:xfrm>
+        </p:spPr>
+        <p:txBody>
+          <a:bodyPr/>
+          <a:lstStyle/>
+          <a:p>
+            <a:pPr algn="ctr"/>
+            <a:r>
+              <a:rPr lang="en-US" dirty="0"/>
+              <a:t>Brands</a:t>
+            </a:r>
+            <a:endParaRPr lang="it-IT" dirty="0"/>
+          </a:p>
+        </p:txBody>
+      </p:sp>
+      <p:sp>
+        <p:nvSpPr>
+          <p:cNvPr id="4" name="TextBox 3">
+            <a:extLst>
+              <a:ext uri="{FF2B5EF4-FFF2-40B4-BE49-F238E27FC236}">
+                <a16:creationId xmlns:a16="http://schemas.microsoft.com/office/drawing/2014/main" id="{215CCF82-D737-A9B0-A31C-2C026D4E8122}"/>
+              </a:ext>
+            </a:extLst>
+          </p:cNvPr>
+          <p:cNvSpPr txBox="1"/>
+          <p:nvPr/>
+        </p:nvSpPr>
+        <p:spPr>
+          <a:xfrm>
+            <a:off x="838200" y="1080656"/>
+            <a:ext cx="10515600" cy="646331"/>
+          </a:xfrm>
+          <a:prstGeom prst="rect">
+            <a:avLst/>
+          </a:prstGeom>
+          <a:noFill/>
+        </p:spPr>
+        <p:txBody>
+          <a:bodyPr wrap="square" rtlCol="0">
+            <a:spAutoFit/>
+          </a:bodyPr>
+          <a:lstStyle/>
+          <a:p>
+            <a:r>
+              <a:rPr lang="it-IT" b="0" i="0" dirty="0">
+                <a:solidFill>
+                  <a:srgbClr val="212529"/>
+                </a:solidFill>
+                <a:effectLst/>
+                <a:latin typeface="Gotham"/>
+              </a:rPr>
+              <a:t>(da modificare) Elica possiede un Global Brand portfolio completo, in grado di rispondere a tutte le esigenze del mercato. Ogni Brand ha un’identità precisa e distintiva, ma tutti sono ispirati da una visione comune.</a:t>
+            </a:r>
+            <a:endParaRPr lang="it-IT" dirty="0"/>
+          </a:p>
+        </p:txBody>
+      </p:sp>
+      <p:sp>
+        <p:nvSpPr>
+          <p:cNvPr id="7" name="Rectangle: Rounded Corners 6">
+            <a:extLst>
+              <a:ext uri="{FF2B5EF4-FFF2-40B4-BE49-F238E27FC236}">
+                <a16:creationId xmlns:a16="http://schemas.microsoft.com/office/drawing/2014/main" id="{2739253A-B498-1193-9527-128D3BEBABAC}"/>
+              </a:ext>
+            </a:extLst>
+          </p:cNvPr>
+          <p:cNvSpPr/>
+          <p:nvPr/>
+        </p:nvSpPr>
+        <p:spPr>
+          <a:xfrm>
+            <a:off x="606829" y="2377440"/>
+            <a:ext cx="1770611" cy="646331"/>
+          </a:xfrm>
+          <a:prstGeom prst="roundRect">
+            <a:avLst/>
+          </a:prstGeom>
+          <a:solidFill>
+            <a:srgbClr val="252323"/>
+          </a:solidFill>
+          <a:ln>
+            <a:noFill/>
+          </a:ln>
+        </p:spPr>
+        <p:style>
+          <a:lnRef idx="2">
+            <a:schemeClr val="accent1">
+              <a:shade val="50000"/>
+            </a:schemeClr>
+          </a:lnRef>
+          <a:fillRef idx="1">
+            <a:schemeClr val="accent1"/>
+          </a:fillRef>
+          <a:effectRef idx="0">
+            <a:schemeClr val="accent1"/>
+          </a:effectRef>
+          <a:fontRef idx="minor">
+            <a:schemeClr val="lt1"/>
+          </a:fontRef>
+        </p:style>
+        <p:txBody>
+          <a:bodyPr rtlCol="0" anchor="ctr"/>
+          <a:lstStyle/>
+          <a:p>
+            <a:pPr algn="ctr"/>
+            <a:endParaRPr lang="it-IT"/>
+          </a:p>
+        </p:txBody>
+      </p:sp>
+      <p:pic>
+        <p:nvPicPr>
+          <p:cNvPr id="8" name="Graphic 7">
+            <a:extLst>
+              <a:ext uri="{FF2B5EF4-FFF2-40B4-BE49-F238E27FC236}">
+                <a16:creationId xmlns:a16="http://schemas.microsoft.com/office/drawing/2014/main" id="{DE9D081D-154F-CC1A-78C4-6F7FADA10F45}"/>
+              </a:ext>
+            </a:extLst>
+          </p:cNvPr>
+          <p:cNvPicPr>
+            <a:picLocks noChangeAspect="1"/>
+          </p:cNvPicPr>
+          <p:nvPr/>
+        </p:nvPicPr>
+        <p:blipFill>
+          <a:blip r:embed="rId2">
+            <a:extLst>
+              <a:ext uri="{28A0092B-C50C-407E-A947-70E740481C1C}">
+                <a14:useLocalDpi xmlns:a14="http://schemas.microsoft.com/office/drawing/2010/main" val="0"/>
+              </a:ext>
+              <a:ext uri="{96DAC541-7B7A-43D3-8B79-37D633B846F1}">
+                <asvg:svgBlip xmlns:asvg="http://schemas.microsoft.com/office/drawing/2016/SVG/main" r:embed="rId3"/>
+              </a:ext>
+            </a:extLst>
+          </a:blip>
+          <a:stretch>
+            <a:fillRect/>
+          </a:stretch>
+        </p:blipFill>
+        <p:spPr>
+          <a:xfrm>
+            <a:off x="775574" y="2557293"/>
+            <a:ext cx="1433120" cy="286624"/>
+          </a:xfrm>
+          <a:prstGeom prst="rect">
+            <a:avLst/>
+          </a:prstGeom>
+        </p:spPr>
+      </p:pic>
+      <p:sp>
+        <p:nvSpPr>
+          <p:cNvPr id="9" name="TextBox 8">
+            <a:extLst>
+              <a:ext uri="{FF2B5EF4-FFF2-40B4-BE49-F238E27FC236}">
+                <a16:creationId xmlns:a16="http://schemas.microsoft.com/office/drawing/2014/main" id="{E5004C14-2BCF-DD49-2960-086BBCB03168}"/>
+              </a:ext>
+            </a:extLst>
+          </p:cNvPr>
+          <p:cNvSpPr txBox="1"/>
+          <p:nvPr/>
+        </p:nvSpPr>
+        <p:spPr>
+          <a:xfrm>
+            <a:off x="2718261" y="2377440"/>
+            <a:ext cx="2435629" cy="369332"/>
+          </a:xfrm>
+          <a:prstGeom prst="rect">
+            <a:avLst/>
+          </a:prstGeom>
+          <a:noFill/>
+        </p:spPr>
+        <p:txBody>
+          <a:bodyPr wrap="square" rtlCol="0">
+            <a:spAutoFit/>
+          </a:bodyPr>
+          <a:lstStyle/>
+          <a:p>
+            <a:r>
+              <a:rPr lang="en-US" dirty="0" err="1"/>
+              <a:t>Spiegazione</a:t>
+            </a:r>
+            <a:r>
+              <a:rPr lang="en-US" dirty="0"/>
+              <a:t>…</a:t>
+            </a:r>
+            <a:endParaRPr lang="it-IT" dirty="0"/>
+          </a:p>
+        </p:txBody>
+      </p:sp>
+      <p:sp>
+        <p:nvSpPr>
+          <p:cNvPr id="10" name="TextBox 9">
+            <a:extLst>
+              <a:ext uri="{FF2B5EF4-FFF2-40B4-BE49-F238E27FC236}">
+                <a16:creationId xmlns:a16="http://schemas.microsoft.com/office/drawing/2014/main" id="{1667F365-7721-C9DE-B292-CB721CFFB0B9}"/>
+              </a:ext>
+            </a:extLst>
+          </p:cNvPr>
+          <p:cNvSpPr txBox="1"/>
+          <p:nvPr/>
+        </p:nvSpPr>
+        <p:spPr>
+          <a:xfrm>
+            <a:off x="606829" y="3244334"/>
+            <a:ext cx="2435629" cy="369332"/>
+          </a:xfrm>
+          <a:prstGeom prst="rect">
+            <a:avLst/>
+          </a:prstGeom>
+          <a:noFill/>
+        </p:spPr>
+        <p:txBody>
+          <a:bodyPr wrap="square" rtlCol="0">
+            <a:spAutoFit/>
+          </a:bodyPr>
+          <a:lstStyle/>
+          <a:p>
+            <a:r>
+              <a:rPr lang="en-US" dirty="0"/>
+              <a:t>…</a:t>
+            </a:r>
+            <a:endParaRPr lang="it-IT" dirty="0"/>
+          </a:p>
+        </p:txBody>
+      </p:sp>
+    </p:spTree>
+    <p:extLst>
+      <p:ext uri="{BB962C8B-B14F-4D97-AF65-F5344CB8AC3E}">
+        <p14:creationId xmlns:p14="http://schemas.microsoft.com/office/powerpoint/2010/main" val="3755644223"/>
+      </p:ext>
+    </p:extLst>
+  </p:cSld>
+  <p:clrMapOvr>
+    <a:masterClrMapping/>
+  </p:clrMapOvr>
+</p:sld>
+</file>
+
+<file path=ppt/slides/slide7.xml><?xml version="1.0" encoding="utf-8"?>
+<p:sld xmlns:a="http://schemas.openxmlformats.org/drawingml/2006/main" xmlns:r="http://schemas.openxmlformats.org/officeDocument/2006/relationships" xmlns:p="http://schemas.openxmlformats.org/presentationml/2006/main">
+  <p:cSld>
+    <p:spTree>
+      <p:nvGrpSpPr>
+        <p:cNvPr id="1" name=""/>
+        <p:cNvGrpSpPr/>
+        <p:nvPr/>
+      </p:nvGrpSpPr>
+      <p:grpSpPr>
+        <a:xfrm>
+          <a:off x="0" y="0"/>
+          <a:ext cx="0" cy="0"/>
+          <a:chOff x="0" y="0"/>
+          <a:chExt cx="0" cy="0"/>
+        </a:xfrm>
+      </p:grpSpPr>
+      <p:sp>
+        <p:nvSpPr>
+          <p:cNvPr id="2" name="Title 1">
+            <a:extLst>
+              <a:ext uri="{FF2B5EF4-FFF2-40B4-BE49-F238E27FC236}">
+                <a16:creationId xmlns:a16="http://schemas.microsoft.com/office/drawing/2014/main" id="{CEB36C71-B638-74E9-FFE4-1D72F94F6472}"/>
+              </a:ext>
+            </a:extLst>
+          </p:cNvPr>
+          <p:cNvSpPr>
+            <a:spLocks noGrp="1"/>
+          </p:cNvSpPr>
+          <p:nvPr>
+            <p:ph type="title"/>
+          </p:nvPr>
+        </p:nvSpPr>
+        <p:spPr/>
+        <p:txBody>
+          <a:bodyPr/>
+          <a:lstStyle/>
+          <a:p>
+            <a:pPr algn="ctr"/>
+            <a:r>
+              <a:rPr lang="en-US" dirty="0"/>
+              <a:t>Influenza di </a:t>
+            </a:r>
+            <a:r>
+              <a:rPr lang="en-US" dirty="0" err="1"/>
+              <a:t>elica</a:t>
+            </a:r>
+            <a:r>
+              <a:rPr lang="en-US" dirty="0"/>
+              <a:t> </a:t>
+            </a:r>
+            <a:r>
+              <a:rPr lang="en-US" dirty="0" err="1"/>
+              <a:t>nel</a:t>
+            </a:r>
+            <a:r>
+              <a:rPr lang="en-US" dirty="0"/>
+              <a:t> mondo (</a:t>
+            </a:r>
+            <a:r>
+              <a:rPr lang="en-US" dirty="0" err="1"/>
+              <a:t>paragrafo</a:t>
+            </a:r>
+            <a:r>
+              <a:rPr lang="en-US" dirty="0"/>
+              <a:t> a </a:t>
+            </a:r>
+            <a:r>
+              <a:rPr lang="en-US" dirty="0" err="1"/>
+              <a:t>sx</a:t>
+            </a:r>
+            <a:r>
+              <a:rPr lang="en-US" dirty="0"/>
+              <a:t>?)</a:t>
+            </a:r>
+            <a:endParaRPr lang="it-IT" dirty="0"/>
+          </a:p>
+        </p:txBody>
+      </p:sp>
+      <p:pic>
+        <p:nvPicPr>
+          <p:cNvPr id="5" name="Content Placeholder 4" descr="Map&#10;&#10;Description automatically generated">
+            <a:extLst>
+              <a:ext uri="{FF2B5EF4-FFF2-40B4-BE49-F238E27FC236}">
+                <a16:creationId xmlns:a16="http://schemas.microsoft.com/office/drawing/2014/main" id="{AD9C8EAC-EEE7-1F3C-FB9E-E4FC042D21FA}"/>
+              </a:ext>
+            </a:extLst>
+          </p:cNvPr>
+          <p:cNvPicPr>
+            <a:picLocks noGrp="1" noChangeAspect="1"/>
+          </p:cNvPicPr>
+          <p:nvPr>
+            <p:ph idx="1"/>
+          </p:nvPr>
+        </p:nvPicPr>
+        <p:blipFill>
+          <a:blip r:embed="rId2">
+            <a:extLst>
+              <a:ext uri="{28A0092B-C50C-407E-A947-70E740481C1C}">
+                <a14:useLocalDpi xmlns:a14="http://schemas.microsoft.com/office/drawing/2010/main" val="0"/>
+              </a:ext>
+            </a:extLst>
+          </a:blip>
+          <a:stretch>
+            <a:fillRect/>
+          </a:stretch>
+        </p:blipFill>
+        <p:spPr>
+          <a:xfrm>
+            <a:off x="3203106" y="2141537"/>
+            <a:ext cx="8150694" cy="4351338"/>
+          </a:xfrm>
+        </p:spPr>
+      </p:pic>
+    </p:spTree>
+    <p:extLst>
+      <p:ext uri="{BB962C8B-B14F-4D97-AF65-F5344CB8AC3E}">
+        <p14:creationId xmlns:p14="http://schemas.microsoft.com/office/powerpoint/2010/main" val="2664552187"/>
+      </p:ext>
+    </p:extLst>
+  </p:cSld>
+  <p:clrMapOvr>
+    <a:masterClrMapping/>
+  </p:clrMapOvr>
+</p:sld>
+</file>
+
+<file path=ppt/slides/slide8.xml><?xml version="1.0" encoding="utf-8"?>
+<p:sld xmlns:a="http://schemas.openxmlformats.org/drawingml/2006/main" xmlns:r="http://schemas.openxmlformats.org/officeDocument/2006/relationships" xmlns:p="http://schemas.openxmlformats.org/presentationml/2006/main">
+  <p:cSld>
+    <p:spTree>
+      <p:nvGrpSpPr>
+        <p:cNvPr id="1" name=""/>
+        <p:cNvGrpSpPr/>
+        <p:nvPr/>
+      </p:nvGrpSpPr>
+      <p:grpSpPr>
+        <a:xfrm>
+          <a:off x="0" y="0"/>
+          <a:ext cx="0" cy="0"/>
+          <a:chOff x="0" y="0"/>
+          <a:chExt cx="0" cy="0"/>
+        </a:xfrm>
+      </p:grpSpPr>
+      <p:sp>
+        <p:nvSpPr>
+          <p:cNvPr id="2" name="Title 1">
+            <a:extLst>
+              <a:ext uri="{FF2B5EF4-FFF2-40B4-BE49-F238E27FC236}">
+                <a16:creationId xmlns:a16="http://schemas.microsoft.com/office/drawing/2014/main" id="{BD56C7A4-E70E-99D0-3DF1-653A0F35ABE7}"/>
+              </a:ext>
+            </a:extLst>
+          </p:cNvPr>
+          <p:cNvSpPr>
+            <a:spLocks noGrp="1"/>
+          </p:cNvSpPr>
+          <p:nvPr>
+            <p:ph type="title"/>
+          </p:nvPr>
+        </p:nvSpPr>
+        <p:spPr>
+          <a:xfrm>
+            <a:off x="838200" y="365125"/>
+            <a:ext cx="10515600" cy="615777"/>
+          </a:xfrm>
+        </p:spPr>
+        <p:txBody>
+          <a:bodyPr>
+            <a:normAutofit fontScale="90000"/>
+          </a:bodyPr>
+          <a:lstStyle/>
+          <a:p>
+            <a:pPr algn="ctr"/>
+            <a:r>
+              <a:rPr lang="en-US" dirty="0"/>
+              <a:t>Sistema di Governance</a:t>
+            </a:r>
+            <a:endParaRPr lang="it-IT" dirty="0"/>
+          </a:p>
+        </p:txBody>
+      </p:sp>
+      <p:sp>
+        <p:nvSpPr>
+          <p:cNvPr id="3" name="Content Placeholder 2">
+            <a:extLst>
+              <a:ext uri="{FF2B5EF4-FFF2-40B4-BE49-F238E27FC236}">
+                <a16:creationId xmlns:a16="http://schemas.microsoft.com/office/drawing/2014/main" id="{701BAE45-3540-4CC4-1590-F478FC0F5118}"/>
+              </a:ext>
+            </a:extLst>
+          </p:cNvPr>
+          <p:cNvSpPr>
+            <a:spLocks noGrp="1"/>
+          </p:cNvSpPr>
+          <p:nvPr>
+            <p:ph idx="1"/>
+          </p:nvPr>
+        </p:nvSpPr>
+        <p:spPr>
+          <a:xfrm>
+            <a:off x="838200" y="980902"/>
+            <a:ext cx="10515600" cy="5196061"/>
+          </a:xfrm>
+        </p:spPr>
+        <p:txBody>
+          <a:bodyPr>
+            <a:normAutofit/>
+          </a:bodyPr>
+          <a:lstStyle/>
+          <a:p>
+            <a:pPr marL="0" indent="0">
+              <a:buNone/>
+            </a:pPr>
+            <a:r>
+              <a:rPr lang="it-IT" sz="1800" b="0" i="0" dirty="0">
+                <a:solidFill>
+                  <a:srgbClr val="212529"/>
+                </a:solidFill>
+                <a:effectLst/>
+                <a:latin typeface="Gotham"/>
+              </a:rPr>
+              <a:t>(da analizzare e schematizzare) Elica S.p.A. ha aderito al Codice di Corporate Governance di Borsa Italiana, adottando un sistema di governo in linea con le best practice nazionali ed internazionali per la propria </a:t>
+            </a:r>
+            <a:r>
+              <a:rPr lang="it-IT" sz="1800" b="0" i="1" dirty="0">
+                <a:solidFill>
+                  <a:srgbClr val="212529"/>
+                </a:solidFill>
+                <a:effectLst/>
+                <a:latin typeface="Gotham"/>
+              </a:rPr>
+              <a:t>Corporate Governance</a:t>
+            </a:r>
+            <a:r>
+              <a:rPr lang="it-IT" sz="1800" b="0" i="0" dirty="0">
+                <a:solidFill>
+                  <a:srgbClr val="212529"/>
+                </a:solidFill>
+                <a:effectLst/>
+                <a:latin typeface="Gotham"/>
+              </a:rPr>
+              <a:t>.</a:t>
+            </a:r>
+          </a:p>
+          <a:p>
+            <a:pPr marL="0" indent="0">
+              <a:buNone/>
+            </a:pPr>
+            <a:r>
+              <a:rPr lang="it-IT" sz="1800" b="0" i="0" dirty="0">
+                <a:solidFill>
+                  <a:srgbClr val="212529"/>
+                </a:solidFill>
+                <a:effectLst/>
+                <a:latin typeface="Gotham"/>
+              </a:rPr>
+              <a:t>L’azienda ha impiegato un modello di amministrazione e controllo di stampo tradizionale: la gestione aziendale è esercitata da un Consiglio di Amministrazione coadiuvato da Comitati </a:t>
+            </a:r>
+            <a:r>
+              <a:rPr lang="it-IT" sz="1800" b="0" i="0" dirty="0" err="1">
+                <a:solidFill>
+                  <a:srgbClr val="212529"/>
+                </a:solidFill>
+                <a:effectLst/>
+                <a:latin typeface="Gotham"/>
+              </a:rPr>
+              <a:t>endoconsiliari</a:t>
+            </a:r>
+            <a:r>
+              <a:rPr lang="it-IT" sz="1800" b="0" i="0" dirty="0">
+                <a:solidFill>
+                  <a:srgbClr val="212529"/>
+                </a:solidFill>
+                <a:effectLst/>
+                <a:latin typeface="Gotham"/>
+              </a:rPr>
+              <a:t> (un Comitato per le Nomine e per la Remunerazione e un Comitato per il Controllo, Rischi e Sostenibilità), mentre le funzioni di vigilanza vengono svolte da un Collegio Sindacale.</a:t>
+            </a:r>
+          </a:p>
+          <a:p>
+            <a:pPr marL="0" indent="0">
+              <a:buNone/>
+            </a:pPr>
+            <a:endParaRPr lang="it-IT" sz="1800" dirty="0">
+              <a:solidFill>
+                <a:srgbClr val="212529"/>
+              </a:solidFill>
+              <a:latin typeface="Gotham"/>
+            </a:endParaRPr>
+          </a:p>
+          <a:p>
+            <a:pPr marL="0" indent="0">
+              <a:buNone/>
+            </a:pPr>
+            <a:r>
+              <a:rPr lang="it-IT" sz="1800" dirty="0">
+                <a:solidFill>
+                  <a:srgbClr val="212529"/>
+                </a:solidFill>
+                <a:latin typeface="Gotham"/>
+              </a:rPr>
+              <a:t>(da elencare i più</a:t>
+            </a:r>
+            <a:r>
+              <a:rPr lang="en-US" sz="1800" dirty="0">
+                <a:solidFill>
+                  <a:srgbClr val="212529"/>
+                </a:solidFill>
+                <a:latin typeface="Gotham"/>
+              </a:rPr>
+              <a:t> </a:t>
+            </a:r>
+            <a:r>
+              <a:rPr lang="en-US" sz="1800" dirty="0" err="1">
+                <a:solidFill>
+                  <a:srgbClr val="212529"/>
+                </a:solidFill>
+                <a:latin typeface="Gotham"/>
+              </a:rPr>
+              <a:t>importanti</a:t>
+            </a:r>
+            <a:r>
+              <a:rPr lang="it-IT" sz="1800" dirty="0">
+                <a:solidFill>
+                  <a:srgbClr val="212529"/>
+                </a:solidFill>
+                <a:latin typeface="Gotham"/>
+              </a:rPr>
+              <a:t>)</a:t>
+            </a:r>
+          </a:p>
+          <a:p>
+            <a:pPr marL="0" indent="0">
+              <a:buNone/>
+            </a:pPr>
+            <a:r>
+              <a:rPr lang="it-IT" sz="1600" b="0" i="0" cap="all" dirty="0">
+                <a:effectLst/>
+                <a:latin typeface="Gotham"/>
+              </a:rPr>
+              <a:t>CONSIGLIO DI AMMINISTRAZIONE</a:t>
+            </a:r>
+          </a:p>
+          <a:p>
+            <a:pPr marL="0" indent="0">
+              <a:buNone/>
+            </a:pPr>
+            <a:r>
+              <a:rPr lang="it-IT" sz="1600" b="0" i="0" cap="all" dirty="0">
+                <a:effectLst/>
+                <a:latin typeface="Gotham"/>
+              </a:rPr>
+              <a:t>COLLEGIO SINDACALE</a:t>
+            </a:r>
+          </a:p>
+          <a:p>
+            <a:pPr marL="0" indent="0">
+              <a:buNone/>
+            </a:pPr>
+            <a:r>
+              <a:rPr lang="it-IT" sz="1600" b="0" i="0" cap="all" dirty="0">
+                <a:effectLst/>
+                <a:latin typeface="Gotham"/>
+              </a:rPr>
+              <a:t>COMITATI</a:t>
+            </a:r>
+            <a:endParaRPr lang="it-IT" sz="1200" b="0" i="0" cap="all" dirty="0">
+              <a:effectLst/>
+              <a:latin typeface="Gotham"/>
+            </a:endParaRPr>
+          </a:p>
+        </p:txBody>
+      </p:sp>
+    </p:spTree>
+    <p:extLst>
+      <p:ext uri="{BB962C8B-B14F-4D97-AF65-F5344CB8AC3E}">
+        <p14:creationId xmlns:p14="http://schemas.microsoft.com/office/powerpoint/2010/main" val="574420194"/>
+      </p:ext>
+    </p:extLst>
+  </p:cSld>
+  <p:clrMapOvr>
+    <a:masterClrMapping/>
+  </p:clrMapOvr>
+</p:sld>
+</file>
+
+<file path=ppt/slides/slide9.xml><?xml version="1.0" encoding="utf-8"?>
+<p:sld xmlns:a="http://schemas.openxmlformats.org/drawingml/2006/main" xmlns:r="http://schemas.openxmlformats.org/officeDocument/2006/relationships" xmlns:p="http://schemas.openxmlformats.org/presentationml/2006/main">
+  <p:cSld>
+    <p:spTree>
+      <p:nvGrpSpPr>
+        <p:cNvPr id="1" name=""/>
+        <p:cNvGrpSpPr/>
+        <p:nvPr/>
+      </p:nvGrpSpPr>
+      <p:grpSpPr>
+        <a:xfrm>
+          <a:off x="0" y="0"/>
+          <a:ext cx="0" cy="0"/>
+          <a:chOff x="0" y="0"/>
+          <a:chExt cx="0" cy="0"/>
+        </a:xfrm>
+      </p:grpSpPr>
+      <p:sp>
+        <p:nvSpPr>
+          <p:cNvPr id="2" name="Title 1">
+            <a:extLst>
+              <a:ext uri="{FF2B5EF4-FFF2-40B4-BE49-F238E27FC236}">
+                <a16:creationId xmlns:a16="http://schemas.microsoft.com/office/drawing/2014/main" id="{AB96BDCC-BA03-1E18-F876-2527144CFFB0}"/>
+              </a:ext>
+            </a:extLst>
+          </p:cNvPr>
+          <p:cNvSpPr>
+            <a:spLocks noGrp="1"/>
+          </p:cNvSpPr>
+          <p:nvPr>
+            <p:ph type="title"/>
+          </p:nvPr>
+        </p:nvSpPr>
+        <p:spPr/>
+        <p:txBody>
+          <a:bodyPr/>
+          <a:lstStyle/>
+          <a:p>
+            <a:pPr algn="ctr"/>
+            <a:r>
+              <a:rPr lang="en-US" dirty="0"/>
+              <a:t>Business Model</a:t>
+            </a:r>
+            <a:endParaRPr lang="it-IT" dirty="0"/>
+          </a:p>
+        </p:txBody>
+      </p:sp>
+      <p:sp>
+        <p:nvSpPr>
+          <p:cNvPr id="3" name="Content Placeholder 2">
+            <a:extLst>
+              <a:ext uri="{FF2B5EF4-FFF2-40B4-BE49-F238E27FC236}">
+                <a16:creationId xmlns:a16="http://schemas.microsoft.com/office/drawing/2014/main" id="{DB89865F-98D7-A88B-DD87-CF280D4CAD59}"/>
+              </a:ext>
+            </a:extLst>
+          </p:cNvPr>
+          <p:cNvSpPr>
+            <a:spLocks noGrp="1"/>
+          </p:cNvSpPr>
+          <p:nvPr>
+            <p:ph idx="1"/>
+          </p:nvPr>
+        </p:nvSpPr>
+        <p:spPr/>
+        <p:txBody>
+          <a:bodyPr/>
+          <a:lstStyle/>
+          <a:p>
+            <a:endParaRPr lang="it-IT"/>
+          </a:p>
+        </p:txBody>
+      </p:sp>
+    </p:spTree>
+    <p:extLst>
+      <p:ext uri="{BB962C8B-B14F-4D97-AF65-F5344CB8AC3E}">
+        <p14:creationId xmlns:p14="http://schemas.microsoft.com/office/powerpoint/2010/main" val="3488849015"/>
       </p:ext>
     </p:extLst>
   </p:cSld>

</xml_diff>

<commit_message>
Sfondo alle slide e Table of contents
</commit_message>
<xml_diff>
--- a/I Due Moschettieri.pptx
+++ b/I Due Moschettieri.pptx
@@ -269,7 +269,7 @@
           <a:p>
             <a:fld id="{1EFCC690-7CBF-47E6-BE6E-0EC1C9E624CE}" type="datetimeFigureOut">
               <a:rPr lang="it-IT" smtClean="0"/>
-              <a:t>02/05/2023</a:t>
+              <a:t>03/05/2023</a:t>
             </a:fld>
             <a:endParaRPr lang="it-IT"/>
           </a:p>
@@ -469,7 +469,7 @@
           <a:p>
             <a:fld id="{1EFCC690-7CBF-47E6-BE6E-0EC1C9E624CE}" type="datetimeFigureOut">
               <a:rPr lang="it-IT" smtClean="0"/>
-              <a:t>02/05/2023</a:t>
+              <a:t>03/05/2023</a:t>
             </a:fld>
             <a:endParaRPr lang="it-IT"/>
           </a:p>
@@ -679,7 +679,7 @@
           <a:p>
             <a:fld id="{1EFCC690-7CBF-47E6-BE6E-0EC1C9E624CE}" type="datetimeFigureOut">
               <a:rPr lang="it-IT" smtClean="0"/>
-              <a:t>02/05/2023</a:t>
+              <a:t>03/05/2023</a:t>
             </a:fld>
             <a:endParaRPr lang="it-IT"/>
           </a:p>
@@ -879,7 +879,7 @@
           <a:p>
             <a:fld id="{1EFCC690-7CBF-47E6-BE6E-0EC1C9E624CE}" type="datetimeFigureOut">
               <a:rPr lang="it-IT" smtClean="0"/>
-              <a:t>02/05/2023</a:t>
+              <a:t>03/05/2023</a:t>
             </a:fld>
             <a:endParaRPr lang="it-IT"/>
           </a:p>
@@ -1155,7 +1155,7 @@
           <a:p>
             <a:fld id="{1EFCC690-7CBF-47E6-BE6E-0EC1C9E624CE}" type="datetimeFigureOut">
               <a:rPr lang="it-IT" smtClean="0"/>
-              <a:t>02/05/2023</a:t>
+              <a:t>03/05/2023</a:t>
             </a:fld>
             <a:endParaRPr lang="it-IT"/>
           </a:p>
@@ -1423,7 +1423,7 @@
           <a:p>
             <a:fld id="{1EFCC690-7CBF-47E6-BE6E-0EC1C9E624CE}" type="datetimeFigureOut">
               <a:rPr lang="it-IT" smtClean="0"/>
-              <a:t>02/05/2023</a:t>
+              <a:t>03/05/2023</a:t>
             </a:fld>
             <a:endParaRPr lang="it-IT"/>
           </a:p>
@@ -1838,7 +1838,7 @@
           <a:p>
             <a:fld id="{1EFCC690-7CBF-47E6-BE6E-0EC1C9E624CE}" type="datetimeFigureOut">
               <a:rPr lang="it-IT" smtClean="0"/>
-              <a:t>02/05/2023</a:t>
+              <a:t>03/05/2023</a:t>
             </a:fld>
             <a:endParaRPr lang="it-IT"/>
           </a:p>
@@ -1980,7 +1980,7 @@
           <a:p>
             <a:fld id="{1EFCC690-7CBF-47E6-BE6E-0EC1C9E624CE}" type="datetimeFigureOut">
               <a:rPr lang="it-IT" smtClean="0"/>
-              <a:t>02/05/2023</a:t>
+              <a:t>03/05/2023</a:t>
             </a:fld>
             <a:endParaRPr lang="it-IT"/>
           </a:p>
@@ -2093,7 +2093,7 @@
           <a:p>
             <a:fld id="{1EFCC690-7CBF-47E6-BE6E-0EC1C9E624CE}" type="datetimeFigureOut">
               <a:rPr lang="it-IT" smtClean="0"/>
-              <a:t>02/05/2023</a:t>
+              <a:t>03/05/2023</a:t>
             </a:fld>
             <a:endParaRPr lang="it-IT"/>
           </a:p>
@@ -2406,7 +2406,7 @@
           <a:p>
             <a:fld id="{1EFCC690-7CBF-47E6-BE6E-0EC1C9E624CE}" type="datetimeFigureOut">
               <a:rPr lang="it-IT" smtClean="0"/>
-              <a:t>02/05/2023</a:t>
+              <a:t>03/05/2023</a:t>
             </a:fld>
             <a:endParaRPr lang="it-IT"/>
           </a:p>
@@ -2695,7 +2695,7 @@
           <a:p>
             <a:fld id="{1EFCC690-7CBF-47E6-BE6E-0EC1C9E624CE}" type="datetimeFigureOut">
               <a:rPr lang="it-IT" smtClean="0"/>
-              <a:t>02/05/2023</a:t>
+              <a:t>03/05/2023</a:t>
             </a:fld>
             <a:endParaRPr lang="it-IT"/>
           </a:p>
@@ -2772,9 +2772,24 @@
 <p:sldMaster xmlns:a="http://schemas.openxmlformats.org/drawingml/2006/main" xmlns:r="http://schemas.openxmlformats.org/officeDocument/2006/relationships" xmlns:p="http://schemas.openxmlformats.org/presentationml/2006/main">
   <p:cSld>
     <p:bg>
-      <p:bgRef idx="1001">
-        <a:schemeClr val="bg1"/>
-      </p:bgRef>
+      <p:bgPr>
+        <a:gradFill flip="none" rotWithShape="1">
+          <a:gsLst>
+            <a:gs pos="12000">
+              <a:srgbClr val="DB504A"/>
+            </a:gs>
+            <a:gs pos="100000">
+              <a:srgbClr val="276FBF"/>
+            </a:gs>
+            <a:gs pos="50000">
+              <a:srgbClr val="2EC4B6"/>
+            </a:gs>
+          </a:gsLst>
+          <a:lin ang="8100000" scaled="0"/>
+          <a:tileRect/>
+        </a:gradFill>
+        <a:effectLst/>
+      </p:bgPr>
     </p:bg>
     <p:spTree>
       <p:nvGrpSpPr>
@@ -2938,7 +2953,7 @@
           <a:p>
             <a:fld id="{1EFCC690-7CBF-47E6-BE6E-0EC1C9E624CE}" type="datetimeFigureOut">
               <a:rPr lang="it-IT" smtClean="0"/>
-              <a:t>02/05/2023</a:t>
+              <a:t>03/05/2023</a:t>
             </a:fld>
             <a:endParaRPr lang="it-IT"/>
           </a:p>
@@ -3357,10 +3372,10 @@
       </p:grpSpPr>
       <p:sp>
         <p:nvSpPr>
-          <p:cNvPr id="13" name="Rectangle 12">
-            <a:extLst>
-              <a:ext uri="{FF2B5EF4-FFF2-40B4-BE49-F238E27FC236}">
-                <a16:creationId xmlns:a16="http://schemas.microsoft.com/office/drawing/2014/main" id="{080B445E-1168-7DA0-1674-6DC4542334BF}"/>
+          <p:cNvPr id="3" name="Rectangle: Rounded Corners 2">
+            <a:extLst>
+              <a:ext uri="{FF2B5EF4-FFF2-40B4-BE49-F238E27FC236}">
+                <a16:creationId xmlns:a16="http://schemas.microsoft.com/office/drawing/2014/main" id="{873E463C-642B-84D5-81E4-89D2EABF918A}"/>
               </a:ext>
             </a:extLst>
           </p:cNvPr>
@@ -3369,10 +3384,10 @@
         </p:nvSpPr>
         <p:spPr>
           <a:xfrm>
-            <a:off x="3959630" y="279399"/>
-            <a:ext cx="4272742" cy="1592055"/>
-          </a:xfrm>
-          <a:prstGeom prst="rect">
+            <a:off x="2778110" y="2457963"/>
+            <a:ext cx="6635776" cy="1848027"/>
+          </a:xfrm>
+          <a:prstGeom prst="roundRect">
             <a:avLst/>
           </a:prstGeom>
           <a:solidFill>
@@ -3407,10 +3422,10 @@
       </p:sp>
       <p:sp>
         <p:nvSpPr>
-          <p:cNvPr id="14" name="Rectangle 13">
-            <a:extLst>
-              <a:ext uri="{FF2B5EF4-FFF2-40B4-BE49-F238E27FC236}">
-                <a16:creationId xmlns:a16="http://schemas.microsoft.com/office/drawing/2014/main" id="{3F6A8984-B6C7-3954-EAF4-EDAD6669E57E}"/>
+          <p:cNvPr id="13" name="Rectangle: Rounded Corners 12">
+            <a:extLst>
+              <a:ext uri="{FF2B5EF4-FFF2-40B4-BE49-F238E27FC236}">
+                <a16:creationId xmlns:a16="http://schemas.microsoft.com/office/drawing/2014/main" id="{080B445E-1168-7DA0-1674-6DC4542334BF}"/>
               </a:ext>
             </a:extLst>
           </p:cNvPr>
@@ -3419,10 +3434,10 @@
         </p:nvSpPr>
         <p:spPr>
           <a:xfrm>
-            <a:off x="3491346" y="4686416"/>
-            <a:ext cx="5209307" cy="1592055"/>
-          </a:xfrm>
-          <a:prstGeom prst="rect">
+            <a:off x="3959630" y="279399"/>
+            <a:ext cx="4272742" cy="1592055"/>
+          </a:xfrm>
+          <a:prstGeom prst="roundRect">
             <a:avLst/>
           </a:prstGeom>
           <a:solidFill>
@@ -3457,6 +3472,56 @@
       </p:sp>
       <p:sp>
         <p:nvSpPr>
+          <p:cNvPr id="14" name="Rectangle: Rounded Corners 13">
+            <a:extLst>
+              <a:ext uri="{FF2B5EF4-FFF2-40B4-BE49-F238E27FC236}">
+                <a16:creationId xmlns:a16="http://schemas.microsoft.com/office/drawing/2014/main" id="{3F6A8984-B6C7-3954-EAF4-EDAD6669E57E}"/>
+              </a:ext>
+            </a:extLst>
+          </p:cNvPr>
+          <p:cNvSpPr/>
+          <p:nvPr/>
+        </p:nvSpPr>
+        <p:spPr>
+          <a:xfrm>
+            <a:off x="3491347" y="4892499"/>
+            <a:ext cx="5209307" cy="1592055"/>
+          </a:xfrm>
+          <a:prstGeom prst="roundRect">
+            <a:avLst/>
+          </a:prstGeom>
+          <a:solidFill>
+            <a:srgbClr val="F7E1D7"/>
+          </a:solidFill>
+          <a:ln>
+            <a:noFill/>
+          </a:ln>
+        </p:spPr>
+        <p:style>
+          <a:lnRef idx="1">
+            <a:schemeClr val="accent5"/>
+          </a:lnRef>
+          <a:fillRef idx="2">
+            <a:schemeClr val="accent5"/>
+          </a:fillRef>
+          <a:effectRef idx="1">
+            <a:schemeClr val="accent5"/>
+          </a:effectRef>
+          <a:fontRef idx="minor">
+            <a:schemeClr val="dk1"/>
+          </a:fontRef>
+        </p:style>
+        <p:txBody>
+          <a:bodyPr rtlCol="0" anchor="ctr"/>
+          <a:lstStyle/>
+          <a:p>
+            <a:pPr algn="ctr"/>
+            <a:endParaRPr lang="it-IT"/>
+          </a:p>
+        </p:txBody>
+      </p:sp>
+      <p:sp>
+        <p:nvSpPr>
           <p:cNvPr id="2" name="Title 1">
             <a:extLst>
               <a:ext uri="{FF2B5EF4-FFF2-40B4-BE49-F238E27FC236}">
@@ -3484,7 +3549,7 @@
             <a:pPr algn="ctr"/>
             <a:r>
               <a:rPr lang="en-US" dirty="0">
-                <a:latin typeface="Cascadia Code Light" panose="020B0609020000020004" pitchFamily="49" charset="0"/>
+                <a:latin typeface="+mn-lt"/>
                 <a:ea typeface="Cascadia Code Light" panose="020B0609020000020004" pitchFamily="49" charset="0"/>
                 <a:cs typeface="Cascadia Code Light" panose="020B0609020000020004" pitchFamily="49" charset="0"/>
               </a:rPr>
@@ -3492,14 +3557,14 @@
             </a:r>
             <a:r>
               <a:rPr lang="en-US" dirty="0" err="1">
-                <a:latin typeface="Cascadia Code Light" panose="020B0609020000020004" pitchFamily="49" charset="0"/>
+                <a:latin typeface="+mn-lt"/>
                 <a:ea typeface="Cascadia Code Light" panose="020B0609020000020004" pitchFamily="49" charset="0"/>
                 <a:cs typeface="Cascadia Code Light" panose="020B0609020000020004" pitchFamily="49" charset="0"/>
               </a:rPr>
               <a:t>Moschettieri</a:t>
             </a:r>
             <a:endParaRPr lang="it-IT" dirty="0">
-              <a:latin typeface="Cascadia Code Light" panose="020B0609020000020004" pitchFamily="49" charset="0"/>
+              <a:latin typeface="+mn-lt"/>
               <a:ea typeface="Cascadia Code Light" panose="020B0609020000020004" pitchFamily="49" charset="0"/>
               <a:cs typeface="Cascadia Code Light" panose="020B0609020000020004" pitchFamily="49" charset="0"/>
             </a:endParaRPr>
@@ -3539,7 +3604,7 @@
         </p:blipFill>
         <p:spPr>
           <a:xfrm>
-            <a:off x="3196430" y="2632972"/>
+            <a:off x="3196428" y="2585948"/>
             <a:ext cx="5799139" cy="1592055"/>
           </a:xfrm>
         </p:spPr>
@@ -3562,7 +3627,7 @@
         </p:nvSpPr>
         <p:spPr>
           <a:xfrm>
-            <a:off x="3667909" y="4605451"/>
+            <a:off x="3667909" y="4811534"/>
             <a:ext cx="4856178" cy="1753986"/>
           </a:xfrm>
         </p:spPr>
@@ -3573,7 +3638,6 @@
             <a:pPr algn="ctr"/>
             <a:r>
               <a:rPr lang="en-US" dirty="0" err="1">
-                <a:latin typeface="Cascadia Code Light" panose="020B0609020000020004" pitchFamily="49" charset="0"/>
                 <a:ea typeface="Cascadia Code Light" panose="020B0609020000020004" pitchFamily="49" charset="0"/>
                 <a:cs typeface="Cascadia Code Light" panose="020B0609020000020004" pitchFamily="49" charset="0"/>
               </a:rPr>
@@ -3581,7 +3645,6 @@
             </a:r>
             <a:r>
               <a:rPr lang="it-IT" dirty="0">
-                <a:latin typeface="Cascadia Code Light" panose="020B0609020000020004" pitchFamily="49" charset="0"/>
                 <a:ea typeface="Cascadia Code Light" panose="020B0609020000020004" pitchFamily="49" charset="0"/>
                 <a:cs typeface="Cascadia Code Light" panose="020B0609020000020004" pitchFamily="49" charset="0"/>
               </a:rPr>
@@ -3589,7 +3652,6 @@
             </a:r>
             <a:r>
               <a:rPr lang="en-US" dirty="0">
-                <a:latin typeface="Cascadia Code Light" panose="020B0609020000020004" pitchFamily="49" charset="0"/>
                 <a:ea typeface="Cascadia Code Light" panose="020B0609020000020004" pitchFamily="49" charset="0"/>
                 <a:cs typeface="Cascadia Code Light" panose="020B0609020000020004" pitchFamily="49" charset="0"/>
               </a:rPr>
@@ -3600,7 +3662,6 @@
             <a:pPr algn="ctr"/>
             <a:r>
               <a:rPr lang="en-US" dirty="0" err="1">
-                <a:latin typeface="Cascadia Code Light" panose="020B0609020000020004" pitchFamily="49" charset="0"/>
                 <a:ea typeface="Cascadia Code Light" panose="020B0609020000020004" pitchFamily="49" charset="0"/>
                 <a:cs typeface="Cascadia Code Light" panose="020B0609020000020004" pitchFamily="49" charset="0"/>
               </a:rPr>
@@ -3608,7 +3669,6 @@
             </a:r>
             <a:r>
               <a:rPr lang="en-US" dirty="0">
-                <a:latin typeface="Cascadia Code Light" panose="020B0609020000020004" pitchFamily="49" charset="0"/>
                 <a:ea typeface="Cascadia Code Light" panose="020B0609020000020004" pitchFamily="49" charset="0"/>
                 <a:cs typeface="Cascadia Code Light" panose="020B0609020000020004" pitchFamily="49" charset="0"/>
               </a:rPr>
@@ -3616,7 +3676,6 @@
             </a:r>
             <a:r>
               <a:rPr lang="en-US" dirty="0" err="1">
-                <a:latin typeface="Cascadia Code Light" panose="020B0609020000020004" pitchFamily="49" charset="0"/>
                 <a:ea typeface="Cascadia Code Light" panose="020B0609020000020004" pitchFamily="49" charset="0"/>
                 <a:cs typeface="Cascadia Code Light" panose="020B0609020000020004" pitchFamily="49" charset="0"/>
               </a:rPr>
@@ -3624,7 +3683,6 @@
             </a:r>
             <a:r>
               <a:rPr lang="en-US" dirty="0">
-                <a:latin typeface="Cascadia Code Light" panose="020B0609020000020004" pitchFamily="49" charset="0"/>
                 <a:ea typeface="Cascadia Code Light" panose="020B0609020000020004" pitchFamily="49" charset="0"/>
                 <a:cs typeface="Cascadia Code Light" panose="020B0609020000020004" pitchFamily="49" charset="0"/>
               </a:rPr>
@@ -3632,14 +3690,12 @@
             </a:r>
             <a:r>
               <a:rPr lang="en-US" dirty="0" err="1">
-                <a:latin typeface="Cascadia Code Light" panose="020B0609020000020004" pitchFamily="49" charset="0"/>
                 <a:ea typeface="Cascadia Code Light" panose="020B0609020000020004" pitchFamily="49" charset="0"/>
                 <a:cs typeface="Cascadia Code Light" panose="020B0609020000020004" pitchFamily="49" charset="0"/>
               </a:rPr>
               <a:t>Aziendale</a:t>
             </a:r>
             <a:endParaRPr lang="en-US" dirty="0">
-              <a:latin typeface="Cascadia Code Light" panose="020B0609020000020004" pitchFamily="49" charset="0"/>
               <a:ea typeface="Cascadia Code Light" panose="020B0609020000020004" pitchFamily="49" charset="0"/>
               <a:cs typeface="Cascadia Code Light" panose="020B0609020000020004" pitchFamily="49" charset="0"/>
             </a:endParaRPr>
@@ -3648,7 +3704,6 @@
             <a:pPr algn="ctr"/>
             <a:r>
               <a:rPr lang="en-US" dirty="0">
-                <a:latin typeface="Cascadia Code Light" panose="020B0609020000020004" pitchFamily="49" charset="0"/>
                 <a:ea typeface="Cascadia Code Light" panose="020B0609020000020004" pitchFamily="49" charset="0"/>
                 <a:cs typeface="Cascadia Code Light" panose="020B0609020000020004" pitchFamily="49" charset="0"/>
               </a:rPr>
@@ -3656,7 +3711,6 @@
             </a:r>
             <a:r>
               <a:rPr lang="en-US" dirty="0" err="1">
-                <a:latin typeface="Cascadia Code Light" panose="020B0609020000020004" pitchFamily="49" charset="0"/>
                 <a:ea typeface="Cascadia Code Light" panose="020B0609020000020004" pitchFamily="49" charset="0"/>
                 <a:cs typeface="Cascadia Code Light" panose="020B0609020000020004" pitchFamily="49" charset="0"/>
               </a:rPr>
@@ -3664,14 +3718,12 @@
             </a:r>
             <a:r>
               <a:rPr lang="en-US" dirty="0">
-                <a:latin typeface="Cascadia Code Light" panose="020B0609020000020004" pitchFamily="49" charset="0"/>
                 <a:ea typeface="Cascadia Code Light" panose="020B0609020000020004" pitchFamily="49" charset="0"/>
                 <a:cs typeface="Cascadia Code Light" panose="020B0609020000020004" pitchFamily="49" charset="0"/>
               </a:rPr>
               <a:t> 2022/2023</a:t>
             </a:r>
             <a:endParaRPr lang="it-IT" dirty="0">
-              <a:latin typeface="Cascadia Code Light" panose="020B0609020000020004" pitchFamily="49" charset="0"/>
               <a:ea typeface="Cascadia Code Light" panose="020B0609020000020004" pitchFamily="49" charset="0"/>
               <a:cs typeface="Cascadia Code Light" panose="020B0609020000020004" pitchFamily="49" charset="0"/>
             </a:endParaRPr>
@@ -3764,8 +3816,8 @@
         </p:nvSpPr>
         <p:spPr>
           <a:xfrm>
-            <a:off x="10166466" y="279892"/>
-            <a:ext cx="1812174" cy="1070659"/>
+            <a:off x="9759051" y="442338"/>
+            <a:ext cx="2185711" cy="1253940"/>
           </a:xfrm>
           <a:prstGeom prst="rect">
             <a:avLst/>
@@ -3833,8 +3885,8 @@
         </p:blipFill>
         <p:spPr>
           <a:xfrm>
-            <a:off x="10251048" y="344514"/>
-            <a:ext cx="1647825" cy="876300"/>
+            <a:off x="9804938" y="514585"/>
+            <a:ext cx="2093935" cy="1113538"/>
           </a:xfrm>
           <a:prstGeom prst="rect">
             <a:avLst/>
@@ -3928,6 +3980,10 @@
           <a:lstStyle/>
           <a:p>
             <a:pPr algn="ctr"/>
+            <a:r>
+              <a:rPr lang="en-US" dirty="0"/>
+              <a:t>Lorenzo Monaci</a:t>
+            </a:r>
             <a:endParaRPr lang="it-IT" dirty="0"/>
           </a:p>
         </p:txBody>
@@ -3954,6 +4010,14 @@
           <a:lstStyle/>
           <a:p>
             <a:pPr algn="ctr"/>
+            <a:r>
+              <a:rPr lang="en-US" dirty="0"/>
+              <a:t>Omar Tomas </a:t>
+            </a:r>
+            <a:r>
+              <a:rPr lang="en-US" dirty="0" err="1"/>
+              <a:t>Sfar</a:t>
+            </a:r>
             <a:endParaRPr lang="it-IT" dirty="0"/>
           </a:p>
         </p:txBody>
@@ -3979,7 +4043,11 @@
           <a:bodyPr/>
           <a:lstStyle/>
           <a:p>
-            <a:endParaRPr lang="it-IT"/>
+            <a:r>
+              <a:rPr lang="en-US" dirty="0"/>
+              <a:t>(FOTO)</a:t>
+            </a:r>
+            <a:endParaRPr lang="it-IT" dirty="0"/>
           </a:p>
         </p:txBody>
       </p:sp>
@@ -4009,6 +4077,10 @@
           <a:bodyPr/>
           <a:lstStyle/>
           <a:p>
+            <a:r>
+              <a:rPr lang="en-US" dirty="0"/>
+              <a:t>(FOTO)</a:t>
+            </a:r>
             <a:endParaRPr lang="it-IT" dirty="0"/>
           </a:p>
         </p:txBody>
@@ -4045,113 +4117,776 @@
       </p:grpSpPr>
       <p:sp>
         <p:nvSpPr>
-          <p:cNvPr id="7" name="Title 6">
-            <a:extLst>
-              <a:ext uri="{FF2B5EF4-FFF2-40B4-BE49-F238E27FC236}">
-                <a16:creationId xmlns:a16="http://schemas.microsoft.com/office/drawing/2014/main" id="{1274AD00-1705-79BB-E305-6794E337D3E9}"/>
-              </a:ext>
-            </a:extLst>
-          </p:cNvPr>
-          <p:cNvSpPr>
-            <a:spLocks noGrp="1"/>
-          </p:cNvSpPr>
-          <p:nvPr>
-            <p:ph type="title"/>
-          </p:nvPr>
-        </p:nvSpPr>
-        <p:spPr/>
-        <p:txBody>
-          <a:bodyPr/>
+          <p:cNvPr id="20" name="Rectangle: Rounded Corners 19">
+            <a:extLst>
+              <a:ext uri="{FF2B5EF4-FFF2-40B4-BE49-F238E27FC236}">
+                <a16:creationId xmlns:a16="http://schemas.microsoft.com/office/drawing/2014/main" id="{2341B1C4-20CE-A004-05BA-6EBF8A78D008}"/>
+              </a:ext>
+            </a:extLst>
+          </p:cNvPr>
+          <p:cNvSpPr/>
+          <p:nvPr/>
+        </p:nvSpPr>
+        <p:spPr>
+          <a:xfrm>
+            <a:off x="1313408" y="571712"/>
+            <a:ext cx="2128059" cy="748145"/>
+          </a:xfrm>
+          <a:prstGeom prst="roundRect">
+            <a:avLst/>
+          </a:prstGeom>
+          <a:solidFill>
+            <a:srgbClr val="252323"/>
+          </a:solidFill>
+          <a:ln>
+            <a:noFill/>
+          </a:ln>
+        </p:spPr>
+        <p:style>
+          <a:lnRef idx="2">
+            <a:schemeClr val="accent1">
+              <a:shade val="50000"/>
+            </a:schemeClr>
+          </a:lnRef>
+          <a:fillRef idx="1">
+            <a:schemeClr val="accent1"/>
+          </a:fillRef>
+          <a:effectRef idx="0">
+            <a:schemeClr val="accent1"/>
+          </a:effectRef>
+          <a:fontRef idx="minor">
+            <a:schemeClr val="lt1"/>
+          </a:fontRef>
+        </p:style>
+        <p:txBody>
+          <a:bodyPr rtlCol="0" anchor="ctr"/>
           <a:lstStyle/>
           <a:p>
             <a:pPr algn="ctr"/>
-            <a:r>
-              <a:rPr lang="en-US" dirty="0" err="1"/>
-              <a:t>Sommario</a:t>
-            </a:r>
-            <a:r>
-              <a:rPr lang="en-US" dirty="0"/>
-              <a:t> (</a:t>
-            </a:r>
-            <a:r>
-              <a:rPr lang="en-US" dirty="0" err="1"/>
-              <a:t>grafico</a:t>
-            </a:r>
-            <a:r>
-              <a:rPr lang="en-US" dirty="0"/>
-              <a:t>…)</a:t>
-            </a:r>
-            <a:endParaRPr lang="it-IT" dirty="0"/>
-          </a:p>
-        </p:txBody>
-      </p:sp>
-      <p:sp>
-        <p:nvSpPr>
-          <p:cNvPr id="8" name="Content Placeholder 7">
-            <a:extLst>
-              <a:ext uri="{FF2B5EF4-FFF2-40B4-BE49-F238E27FC236}">
-                <a16:creationId xmlns:a16="http://schemas.microsoft.com/office/drawing/2014/main" id="{4FC9FB4E-8DB8-4DA4-5B81-9DAF7A40AE3A}"/>
-              </a:ext>
-            </a:extLst>
-          </p:cNvPr>
-          <p:cNvSpPr>
-            <a:spLocks noGrp="1"/>
-          </p:cNvSpPr>
-          <p:nvPr>
-            <p:ph idx="1"/>
-          </p:nvPr>
-        </p:nvSpPr>
-        <p:spPr/>
-        <p:txBody>
-          <a:bodyPr/>
-          <a:lstStyle/>
-          <a:p>
             <a:r>
               <a:rPr lang="en-US" dirty="0" err="1"/>
               <a:t>Presentazione</a:t>
             </a:r>
-            <a:endParaRPr lang="en-US" dirty="0"/>
-          </a:p>
-          <a:p>
+            <a:r>
+              <a:rPr lang="en-US" dirty="0"/>
+              <a:t> Impresa</a:t>
+            </a:r>
+            <a:endParaRPr lang="it-IT" dirty="0"/>
+          </a:p>
+        </p:txBody>
+      </p:sp>
+      <p:sp>
+        <p:nvSpPr>
+          <p:cNvPr id="22" name="Rectangle: Rounded Corners 21">
+            <a:extLst>
+              <a:ext uri="{FF2B5EF4-FFF2-40B4-BE49-F238E27FC236}">
+                <a16:creationId xmlns:a16="http://schemas.microsoft.com/office/drawing/2014/main" id="{FA7A2091-DE66-966F-57F2-E3CE5123EC9F}"/>
+              </a:ext>
+            </a:extLst>
+          </p:cNvPr>
+          <p:cNvSpPr/>
+          <p:nvPr/>
+        </p:nvSpPr>
+        <p:spPr>
+          <a:xfrm>
+            <a:off x="4278285" y="2351567"/>
+            <a:ext cx="2128059" cy="748145"/>
+          </a:xfrm>
+          <a:prstGeom prst="roundRect">
+            <a:avLst/>
+          </a:prstGeom>
+          <a:solidFill>
+            <a:srgbClr val="252323"/>
+          </a:solidFill>
+          <a:ln>
+            <a:noFill/>
+          </a:ln>
+        </p:spPr>
+        <p:style>
+          <a:lnRef idx="2">
+            <a:schemeClr val="accent1">
+              <a:shade val="50000"/>
+            </a:schemeClr>
+          </a:lnRef>
+          <a:fillRef idx="1">
+            <a:schemeClr val="accent1"/>
+          </a:fillRef>
+          <a:effectRef idx="0">
+            <a:schemeClr val="accent1"/>
+          </a:effectRef>
+          <a:fontRef idx="minor">
+            <a:schemeClr val="lt1"/>
+          </a:fontRef>
+        </p:style>
+        <p:txBody>
+          <a:bodyPr rtlCol="0" anchor="ctr"/>
+          <a:lstStyle/>
+          <a:p>
+            <a:pPr algn="ctr"/>
             <a:r>
               <a:rPr lang="en-US" dirty="0"/>
               <a:t>Governance</a:t>
             </a:r>
-          </a:p>
-          <a:p>
+            <a:endParaRPr lang="it-IT" dirty="0"/>
+          </a:p>
+        </p:txBody>
+      </p:sp>
+      <p:sp>
+        <p:nvSpPr>
+          <p:cNvPr id="23" name="Rectangle: Rounded Corners 22">
+            <a:extLst>
+              <a:ext uri="{FF2B5EF4-FFF2-40B4-BE49-F238E27FC236}">
+                <a16:creationId xmlns:a16="http://schemas.microsoft.com/office/drawing/2014/main" id="{033302F5-7FCD-8719-83D4-991E190515BE}"/>
+              </a:ext>
+            </a:extLst>
+          </p:cNvPr>
+          <p:cNvSpPr/>
+          <p:nvPr/>
+        </p:nvSpPr>
+        <p:spPr>
+          <a:xfrm>
+            <a:off x="1313408" y="3477943"/>
+            <a:ext cx="2128059" cy="748145"/>
+          </a:xfrm>
+          <a:prstGeom prst="roundRect">
+            <a:avLst/>
+          </a:prstGeom>
+          <a:solidFill>
+            <a:srgbClr val="252323"/>
+          </a:solidFill>
+          <a:ln>
+            <a:noFill/>
+          </a:ln>
+        </p:spPr>
+        <p:style>
+          <a:lnRef idx="2">
+            <a:schemeClr val="accent1">
+              <a:shade val="50000"/>
+            </a:schemeClr>
+          </a:lnRef>
+          <a:fillRef idx="1">
+            <a:schemeClr val="accent1"/>
+          </a:fillRef>
+          <a:effectRef idx="0">
+            <a:schemeClr val="accent1"/>
+          </a:effectRef>
+          <a:fontRef idx="minor">
+            <a:schemeClr val="lt1"/>
+          </a:fontRef>
+        </p:style>
+        <p:txBody>
+          <a:bodyPr rtlCol="0" anchor="ctr"/>
+          <a:lstStyle/>
+          <a:p>
+            <a:pPr algn="ctr"/>
             <a:r>
               <a:rPr lang="en-US" dirty="0"/>
-              <a:t>Report</a:t>
-            </a:r>
-          </a:p>
-          <a:p>
+              <a:t>Business Mode</a:t>
+            </a:r>
+            <a:r>
+              <a:rPr lang="it-IT" dirty="0"/>
+              <a:t>l</a:t>
+            </a:r>
+            <a:endParaRPr lang="en-US" dirty="0"/>
+          </a:p>
+        </p:txBody>
+      </p:sp>
+      <p:sp>
+        <p:nvSpPr>
+          <p:cNvPr id="24" name="Rectangle: Rounded Corners 23">
+            <a:extLst>
+              <a:ext uri="{FF2B5EF4-FFF2-40B4-BE49-F238E27FC236}">
+                <a16:creationId xmlns:a16="http://schemas.microsoft.com/office/drawing/2014/main" id="{94080C6A-1D51-068A-9B25-154058D3B2B1}"/>
+              </a:ext>
+            </a:extLst>
+          </p:cNvPr>
+          <p:cNvSpPr/>
+          <p:nvPr/>
+        </p:nvSpPr>
+        <p:spPr>
+          <a:xfrm>
+            <a:off x="4278285" y="4633411"/>
+            <a:ext cx="2128059" cy="748145"/>
+          </a:xfrm>
+          <a:prstGeom prst="roundRect">
+            <a:avLst/>
+          </a:prstGeom>
+          <a:solidFill>
+            <a:srgbClr val="252323"/>
+          </a:solidFill>
+          <a:ln>
+            <a:noFill/>
+          </a:ln>
+        </p:spPr>
+        <p:style>
+          <a:lnRef idx="2">
+            <a:schemeClr val="accent1">
+              <a:shade val="50000"/>
+            </a:schemeClr>
+          </a:lnRef>
+          <a:fillRef idx="1">
+            <a:schemeClr val="accent1"/>
+          </a:fillRef>
+          <a:effectRef idx="0">
+            <a:schemeClr val="accent1"/>
+          </a:effectRef>
+          <a:fontRef idx="minor">
+            <a:schemeClr val="lt1"/>
+          </a:fontRef>
+        </p:style>
+        <p:txBody>
+          <a:bodyPr rtlCol="0" anchor="ctr"/>
+          <a:lstStyle/>
+          <a:p>
+            <a:pPr algn="ctr"/>
+            <a:r>
+              <a:rPr lang="en-US" dirty="0" err="1"/>
+              <a:t>Flussi</a:t>
+            </a:r>
             <a:r>
               <a:rPr lang="en-US" dirty="0"/>
-              <a:t>Business Model</a:t>
-            </a:r>
-          </a:p>
-          <a:p>
+              <a:t> di </a:t>
+            </a:r>
             <a:r>
               <a:rPr lang="en-US" dirty="0" err="1"/>
-              <a:t>Riferimenti</a:t>
-            </a:r>
-            <a:r>
-              <a:rPr lang="en-US" dirty="0"/>
-              <a:t> </a:t>
-            </a:r>
+              <a:t>Cassa</a:t>
+            </a:r>
+            <a:endParaRPr lang="it-IT" dirty="0"/>
+          </a:p>
+        </p:txBody>
+      </p:sp>
+      <p:sp>
+        <p:nvSpPr>
+          <p:cNvPr id="25" name="Rectangle: Rounded Corners 24">
+            <a:extLst>
+              <a:ext uri="{FF2B5EF4-FFF2-40B4-BE49-F238E27FC236}">
+                <a16:creationId xmlns:a16="http://schemas.microsoft.com/office/drawing/2014/main" id="{DC783F23-9397-7B80-A724-5E1D5279F5A9}"/>
+              </a:ext>
+            </a:extLst>
+          </p:cNvPr>
+          <p:cNvSpPr/>
+          <p:nvPr/>
+        </p:nvSpPr>
+        <p:spPr>
+          <a:xfrm>
+            <a:off x="6982687" y="5935288"/>
+            <a:ext cx="2128059" cy="748145"/>
+          </a:xfrm>
+          <a:prstGeom prst="roundRect">
+            <a:avLst/>
+          </a:prstGeom>
+          <a:solidFill>
+            <a:srgbClr val="252323"/>
+          </a:solidFill>
+          <a:ln>
+            <a:noFill/>
+          </a:ln>
+        </p:spPr>
+        <p:style>
+          <a:lnRef idx="2">
+            <a:schemeClr val="accent1">
+              <a:shade val="50000"/>
+            </a:schemeClr>
+          </a:lnRef>
+          <a:fillRef idx="1">
+            <a:schemeClr val="accent1"/>
+          </a:fillRef>
+          <a:effectRef idx="0">
+            <a:schemeClr val="accent1"/>
+          </a:effectRef>
+          <a:fontRef idx="minor">
+            <a:schemeClr val="lt1"/>
+          </a:fontRef>
+        </p:style>
+        <p:txBody>
+          <a:bodyPr rtlCol="0" anchor="ctr"/>
+          <a:lstStyle/>
+          <a:p>
+            <a:pPr algn="ctr"/>
             <a:r>
               <a:rPr lang="en-US" dirty="0" err="1"/>
-              <a:t>Bibliografici</a:t>
-            </a:r>
-            <a:r>
-              <a:rPr lang="en-US" dirty="0"/>
-              <a:t>/</a:t>
-            </a:r>
-            <a:r>
-              <a:rPr lang="en-US" dirty="0" err="1"/>
-              <a:t>Sitografici</a:t>
+              <a:t>Bibliografia</a:t>
             </a:r>
             <a:endParaRPr lang="it-IT" dirty="0"/>
+          </a:p>
+        </p:txBody>
+      </p:sp>
+      <p:cxnSp>
+        <p:nvCxnSpPr>
+          <p:cNvPr id="28" name="Connector: Curved 27">
+            <a:extLst>
+              <a:ext uri="{FF2B5EF4-FFF2-40B4-BE49-F238E27FC236}">
+                <a16:creationId xmlns:a16="http://schemas.microsoft.com/office/drawing/2014/main" id="{887C51C7-798B-C0BF-8866-3A8C98FA62D5}"/>
+              </a:ext>
+            </a:extLst>
+          </p:cNvPr>
+          <p:cNvCxnSpPr>
+            <a:cxnSpLocks/>
+            <a:stCxn id="20" idx="2"/>
+            <a:endCxn id="22" idx="0"/>
+          </p:cNvCxnSpPr>
+          <p:nvPr/>
+        </p:nvCxnSpPr>
+        <p:spPr>
+          <a:xfrm rot="16200000" flipH="1">
+            <a:off x="3344021" y="353273"/>
+            <a:ext cx="1031710" cy="2964877"/>
+          </a:xfrm>
+          <a:prstGeom prst="curvedConnector3">
+            <a:avLst>
+              <a:gd name="adj1" fmla="val 33080"/>
+            </a:avLst>
+          </a:prstGeom>
+          <a:ln w="57150">
+            <a:solidFill>
+              <a:srgbClr val="DB504A"/>
+            </a:solidFill>
+            <a:tailEnd type="triangle"/>
+          </a:ln>
+        </p:spPr>
+        <p:style>
+          <a:lnRef idx="1">
+            <a:schemeClr val="accent1"/>
+          </a:lnRef>
+          <a:fillRef idx="0">
+            <a:schemeClr val="accent1"/>
+          </a:fillRef>
+          <a:effectRef idx="0">
+            <a:schemeClr val="accent1"/>
+          </a:effectRef>
+          <a:fontRef idx="minor">
+            <a:schemeClr val="tx1"/>
+          </a:fontRef>
+        </p:style>
+      </p:cxnSp>
+      <p:cxnSp>
+        <p:nvCxnSpPr>
+          <p:cNvPr id="32" name="Connector: Curved 31">
+            <a:extLst>
+              <a:ext uri="{FF2B5EF4-FFF2-40B4-BE49-F238E27FC236}">
+                <a16:creationId xmlns:a16="http://schemas.microsoft.com/office/drawing/2014/main" id="{69E87030-817F-AF5B-8CF9-4A11F1F33F79}"/>
+              </a:ext>
+            </a:extLst>
+          </p:cNvPr>
+          <p:cNvCxnSpPr>
+            <a:cxnSpLocks/>
+            <a:stCxn id="22" idx="1"/>
+            <a:endCxn id="23" idx="0"/>
+          </p:cNvCxnSpPr>
+          <p:nvPr/>
+        </p:nvCxnSpPr>
+        <p:spPr>
+          <a:xfrm rot="10800000" flipV="1">
+            <a:off x="2377439" y="2725639"/>
+            <a:ext cx="1900847" cy="752303"/>
+          </a:xfrm>
+          <a:prstGeom prst="curvedConnector2">
+            <a:avLst/>
+          </a:prstGeom>
+          <a:ln w="57150">
+            <a:solidFill>
+              <a:srgbClr val="DB504A"/>
+            </a:solidFill>
+            <a:tailEnd type="triangle"/>
+          </a:ln>
+        </p:spPr>
+        <p:style>
+          <a:lnRef idx="1">
+            <a:schemeClr val="accent1"/>
+          </a:lnRef>
+          <a:fillRef idx="0">
+            <a:schemeClr val="accent1"/>
+          </a:fillRef>
+          <a:effectRef idx="0">
+            <a:schemeClr val="accent1"/>
+          </a:effectRef>
+          <a:fontRef idx="minor">
+            <a:schemeClr val="tx1"/>
+          </a:fontRef>
+        </p:style>
+      </p:cxnSp>
+      <p:cxnSp>
+        <p:nvCxnSpPr>
+          <p:cNvPr id="35" name="Connector: Curved 34">
+            <a:extLst>
+              <a:ext uri="{FF2B5EF4-FFF2-40B4-BE49-F238E27FC236}">
+                <a16:creationId xmlns:a16="http://schemas.microsoft.com/office/drawing/2014/main" id="{C2744051-E5A4-1988-194F-FA75E8E6EBAA}"/>
+              </a:ext>
+            </a:extLst>
+          </p:cNvPr>
+          <p:cNvCxnSpPr>
+            <a:cxnSpLocks/>
+            <a:stCxn id="23" idx="3"/>
+            <a:endCxn id="24" idx="1"/>
+          </p:cNvCxnSpPr>
+          <p:nvPr/>
+        </p:nvCxnSpPr>
+        <p:spPr>
+          <a:xfrm>
+            <a:off x="3441467" y="3852016"/>
+            <a:ext cx="836818" cy="1155468"/>
+          </a:xfrm>
+          <a:prstGeom prst="curvedConnector3">
+            <a:avLst>
+              <a:gd name="adj1" fmla="val 50000"/>
+            </a:avLst>
+          </a:prstGeom>
+          <a:ln w="57150">
+            <a:solidFill>
+              <a:srgbClr val="DB504A"/>
+            </a:solidFill>
+            <a:tailEnd type="triangle"/>
+          </a:ln>
+        </p:spPr>
+        <p:style>
+          <a:lnRef idx="1">
+            <a:schemeClr val="accent1"/>
+          </a:lnRef>
+          <a:fillRef idx="0">
+            <a:schemeClr val="accent1"/>
+          </a:fillRef>
+          <a:effectRef idx="0">
+            <a:schemeClr val="accent1"/>
+          </a:effectRef>
+          <a:fontRef idx="minor">
+            <a:schemeClr val="tx1"/>
+          </a:fontRef>
+        </p:style>
+      </p:cxnSp>
+      <p:cxnSp>
+        <p:nvCxnSpPr>
+          <p:cNvPr id="38" name="Connector: Curved 37">
+            <a:extLst>
+              <a:ext uri="{FF2B5EF4-FFF2-40B4-BE49-F238E27FC236}">
+                <a16:creationId xmlns:a16="http://schemas.microsoft.com/office/drawing/2014/main" id="{13D2309A-B9F3-375C-92FB-D62DCD9E5981}"/>
+              </a:ext>
+            </a:extLst>
+          </p:cNvPr>
+          <p:cNvCxnSpPr>
+            <a:cxnSpLocks/>
+            <a:stCxn id="24" idx="2"/>
+            <a:endCxn id="25" idx="1"/>
+          </p:cNvCxnSpPr>
+          <p:nvPr/>
+        </p:nvCxnSpPr>
+        <p:spPr>
+          <a:xfrm rot="16200000" flipH="1">
+            <a:off x="5698599" y="5025272"/>
+            <a:ext cx="927805" cy="1640372"/>
+          </a:xfrm>
+          <a:prstGeom prst="curvedConnector2">
+            <a:avLst/>
+          </a:prstGeom>
+          <a:ln w="57150">
+            <a:solidFill>
+              <a:srgbClr val="DB504A"/>
+            </a:solidFill>
+            <a:tailEnd type="triangle"/>
+          </a:ln>
+        </p:spPr>
+        <p:style>
+          <a:lnRef idx="1">
+            <a:schemeClr val="accent1"/>
+          </a:lnRef>
+          <a:fillRef idx="0">
+            <a:schemeClr val="accent1"/>
+          </a:fillRef>
+          <a:effectRef idx="0">
+            <a:schemeClr val="accent1"/>
+          </a:effectRef>
+          <a:fontRef idx="minor">
+            <a:schemeClr val="tx1"/>
+          </a:fontRef>
+        </p:style>
+      </p:cxnSp>
+      <p:pic>
+        <p:nvPicPr>
+          <p:cNvPr id="53" name="Picture 52" descr="Icon&#10;&#10;Description automatically generated">
+            <a:extLst>
+              <a:ext uri="{FF2B5EF4-FFF2-40B4-BE49-F238E27FC236}">
+                <a16:creationId xmlns:a16="http://schemas.microsoft.com/office/drawing/2014/main" id="{4D7F42C7-A390-9815-1F47-10D8DFD7D67B}"/>
+              </a:ext>
+            </a:extLst>
+          </p:cNvPr>
+          <p:cNvPicPr>
+            <a:picLocks noChangeAspect="1"/>
+          </p:cNvPicPr>
+          <p:nvPr/>
+        </p:nvPicPr>
+        <p:blipFill>
+          <a:blip r:embed="rId2">
+            <a:extLst>
+              <a:ext uri="{28A0092B-C50C-407E-A947-70E740481C1C}">
+                <a14:useLocalDpi xmlns:a14="http://schemas.microsoft.com/office/drawing/2010/main" val="0"/>
+              </a:ext>
+            </a:extLst>
+          </a:blip>
+          <a:stretch>
+            <a:fillRect/>
+          </a:stretch>
+        </p:blipFill>
+        <p:spPr>
+          <a:xfrm>
+            <a:off x="903003" y="571711"/>
+            <a:ext cx="748145" cy="748145"/>
+          </a:xfrm>
+          <a:prstGeom prst="rect">
+            <a:avLst/>
+          </a:prstGeom>
+        </p:spPr>
+      </p:pic>
+      <p:pic>
+        <p:nvPicPr>
+          <p:cNvPr id="55" name="Picture 54" descr="Icon&#10;&#10;Description automatically generated">
+            <a:extLst>
+              <a:ext uri="{FF2B5EF4-FFF2-40B4-BE49-F238E27FC236}">
+                <a16:creationId xmlns:a16="http://schemas.microsoft.com/office/drawing/2014/main" id="{E32FCBFF-81DF-376E-AF2D-C41BC8BBF11B}"/>
+              </a:ext>
+            </a:extLst>
+          </p:cNvPr>
+          <p:cNvPicPr>
+            <a:picLocks noChangeAspect="1"/>
+          </p:cNvPicPr>
+          <p:nvPr/>
+        </p:nvPicPr>
+        <p:blipFill>
+          <a:blip r:embed="rId3">
+            <a:extLst>
+              <a:ext uri="{28A0092B-C50C-407E-A947-70E740481C1C}">
+                <a14:useLocalDpi xmlns:a14="http://schemas.microsoft.com/office/drawing/2010/main" val="0"/>
+              </a:ext>
+            </a:extLst>
+          </a:blip>
+          <a:stretch>
+            <a:fillRect/>
+          </a:stretch>
+        </p:blipFill>
+        <p:spPr>
+          <a:xfrm>
+            <a:off x="5957458" y="2351566"/>
+            <a:ext cx="748145" cy="748145"/>
+          </a:xfrm>
+          <a:prstGeom prst="rect">
+            <a:avLst/>
+          </a:prstGeom>
+        </p:spPr>
+      </p:pic>
+      <p:pic>
+        <p:nvPicPr>
+          <p:cNvPr id="57" name="Picture 56" descr="A picture containing icon&#10;&#10;Description automatically generated">
+            <a:extLst>
+              <a:ext uri="{FF2B5EF4-FFF2-40B4-BE49-F238E27FC236}">
+                <a16:creationId xmlns:a16="http://schemas.microsoft.com/office/drawing/2014/main" id="{A9C9C6DD-4CA7-FE84-FB18-3F1CD928EC08}"/>
+              </a:ext>
+            </a:extLst>
+          </p:cNvPr>
+          <p:cNvPicPr>
+            <a:picLocks noChangeAspect="1"/>
+          </p:cNvPicPr>
+          <p:nvPr/>
+        </p:nvPicPr>
+        <p:blipFill>
+          <a:blip r:embed="rId4">
+            <a:extLst>
+              <a:ext uri="{28A0092B-C50C-407E-A947-70E740481C1C}">
+                <a14:useLocalDpi xmlns:a14="http://schemas.microsoft.com/office/drawing/2010/main" val="0"/>
+              </a:ext>
+            </a:extLst>
+          </a:blip>
+          <a:stretch>
+            <a:fillRect/>
+          </a:stretch>
+        </p:blipFill>
+        <p:spPr>
+          <a:xfrm>
+            <a:off x="937258" y="3429000"/>
+            <a:ext cx="752304" cy="752304"/>
+          </a:xfrm>
+          <a:prstGeom prst="rect">
+            <a:avLst/>
+          </a:prstGeom>
+        </p:spPr>
+      </p:pic>
+      <p:pic>
+        <p:nvPicPr>
+          <p:cNvPr id="59" name="Picture 58" descr="Icon&#10;&#10;Description automatically generated">
+            <a:extLst>
+              <a:ext uri="{FF2B5EF4-FFF2-40B4-BE49-F238E27FC236}">
+                <a16:creationId xmlns:a16="http://schemas.microsoft.com/office/drawing/2014/main" id="{F83CD83F-54CC-AF9B-9FE5-C046B3CCD553}"/>
+              </a:ext>
+            </a:extLst>
+          </p:cNvPr>
+          <p:cNvPicPr>
+            <a:picLocks noChangeAspect="1"/>
+          </p:cNvPicPr>
+          <p:nvPr/>
+        </p:nvPicPr>
+        <p:blipFill>
+          <a:blip r:embed="rId5">
+            <a:extLst>
+              <a:ext uri="{28A0092B-C50C-407E-A947-70E740481C1C}">
+                <a14:useLocalDpi xmlns:a14="http://schemas.microsoft.com/office/drawing/2010/main" val="0"/>
+              </a:ext>
+            </a:extLst>
+          </a:blip>
+          <a:stretch>
+            <a:fillRect/>
+          </a:stretch>
+        </p:blipFill>
+        <p:spPr>
+          <a:xfrm>
+            <a:off x="6096000" y="4565041"/>
+            <a:ext cx="748145" cy="748145"/>
+          </a:xfrm>
+          <a:prstGeom prst="rect">
+            <a:avLst/>
+          </a:prstGeom>
+        </p:spPr>
+      </p:pic>
+      <p:pic>
+        <p:nvPicPr>
+          <p:cNvPr id="61" name="Picture 60" descr="Icon&#10;&#10;Description automatically generated">
+            <a:extLst>
+              <a:ext uri="{FF2B5EF4-FFF2-40B4-BE49-F238E27FC236}">
+                <a16:creationId xmlns:a16="http://schemas.microsoft.com/office/drawing/2014/main" id="{07B93896-398E-FAD9-9B9A-2293A10A394F}"/>
+              </a:ext>
+            </a:extLst>
+          </p:cNvPr>
+          <p:cNvPicPr>
+            <a:picLocks noChangeAspect="1"/>
+          </p:cNvPicPr>
+          <p:nvPr/>
+        </p:nvPicPr>
+        <p:blipFill>
+          <a:blip r:embed="rId6">
+            <a:extLst>
+              <a:ext uri="{28A0092B-C50C-407E-A947-70E740481C1C}">
+                <a14:useLocalDpi xmlns:a14="http://schemas.microsoft.com/office/drawing/2010/main" val="0"/>
+              </a:ext>
+            </a:extLst>
+          </a:blip>
+          <a:stretch>
+            <a:fillRect/>
+          </a:stretch>
+        </p:blipFill>
+        <p:spPr>
+          <a:xfrm>
+            <a:off x="8736674" y="5935287"/>
+            <a:ext cx="748145" cy="748145"/>
+          </a:xfrm>
+          <a:prstGeom prst="rect">
+            <a:avLst/>
+          </a:prstGeom>
+        </p:spPr>
+      </p:pic>
+      <p:pic>
+        <p:nvPicPr>
+          <p:cNvPr id="63" name="Picture 62" descr="A large industrial kitchen&#10;&#10;Description automatically generated with low confidence">
+            <a:extLst>
+              <a:ext uri="{FF2B5EF4-FFF2-40B4-BE49-F238E27FC236}">
+                <a16:creationId xmlns:a16="http://schemas.microsoft.com/office/drawing/2014/main" id="{B909C5B8-3969-5733-F126-19C909A2DE88}"/>
+              </a:ext>
+            </a:extLst>
+          </p:cNvPr>
+          <p:cNvPicPr>
+            <a:picLocks noChangeAspect="1"/>
+          </p:cNvPicPr>
+          <p:nvPr/>
+        </p:nvPicPr>
+        <p:blipFill>
+          <a:blip r:embed="rId7">
+            <a:extLst>
+              <a:ext uri="{28A0092B-C50C-407E-A947-70E740481C1C}">
+                <a14:useLocalDpi xmlns:a14="http://schemas.microsoft.com/office/drawing/2010/main" val="0"/>
+              </a:ext>
+            </a:extLst>
+          </a:blip>
+          <a:stretch>
+            <a:fillRect/>
+          </a:stretch>
+        </p:blipFill>
+        <p:spPr>
+          <a:xfrm>
+            <a:off x="7298584" y="1496983"/>
+            <a:ext cx="3864033" cy="3864033"/>
+          </a:xfrm>
+          <a:prstGeom prst="roundRect">
+            <a:avLst>
+              <a:gd name="adj" fmla="val 8594"/>
+            </a:avLst>
+          </a:prstGeom>
+          <a:solidFill>
+            <a:srgbClr val="FFFFFF">
+              <a:shade val="85000"/>
+            </a:srgbClr>
+          </a:solidFill>
+          <a:ln>
+            <a:noFill/>
+          </a:ln>
+          <a:effectLst/>
+        </p:spPr>
+      </p:pic>
+      <p:sp>
+        <p:nvSpPr>
+          <p:cNvPr id="64" name="Rectangle: Rounded Corners 63">
+            <a:extLst>
+              <a:ext uri="{FF2B5EF4-FFF2-40B4-BE49-F238E27FC236}">
+                <a16:creationId xmlns:a16="http://schemas.microsoft.com/office/drawing/2014/main" id="{4F6E1A29-7E7D-AF8C-5E35-0BF3EE78FA9C}"/>
+              </a:ext>
+            </a:extLst>
+          </p:cNvPr>
+          <p:cNvSpPr/>
+          <p:nvPr/>
+        </p:nvSpPr>
+        <p:spPr>
+          <a:xfrm>
+            <a:off x="7298584" y="312871"/>
+            <a:ext cx="3922209" cy="748145"/>
+          </a:xfrm>
+          <a:prstGeom prst="roundRect">
+            <a:avLst/>
+          </a:prstGeom>
+          <a:solidFill>
+            <a:srgbClr val="F7E1D7"/>
+          </a:solidFill>
+          <a:ln>
+            <a:noFill/>
+          </a:ln>
+        </p:spPr>
+        <p:style>
+          <a:lnRef idx="2">
+            <a:schemeClr val="accent1">
+              <a:shade val="50000"/>
+            </a:schemeClr>
+          </a:lnRef>
+          <a:fillRef idx="1">
+            <a:schemeClr val="accent1"/>
+          </a:fillRef>
+          <a:effectRef idx="0">
+            <a:schemeClr val="accent1"/>
+          </a:effectRef>
+          <a:fontRef idx="minor">
+            <a:schemeClr val="lt1"/>
+          </a:fontRef>
+        </p:style>
+        <p:txBody>
+          <a:bodyPr rtlCol="0" anchor="ctr"/>
+          <a:lstStyle/>
+          <a:p>
+            <a:pPr algn="ctr"/>
+            <a:r>
+              <a:rPr lang="en-US" sz="3200" dirty="0">
+                <a:solidFill>
+                  <a:srgbClr val="252323"/>
+                </a:solidFill>
+              </a:rPr>
+              <a:t>Table of Contents</a:t>
+            </a:r>
+            <a:endParaRPr lang="it-IT" dirty="0">
+              <a:solidFill>
+                <a:srgbClr val="252323"/>
+              </a:solidFill>
+            </a:endParaRPr>
           </a:p>
         </p:txBody>
       </p:sp>
@@ -5282,40 +6017,550 @@
       </p:sp>
       <p:sp>
         <p:nvSpPr>
-          <p:cNvPr id="10" name="TextBox 9">
-            <a:extLst>
-              <a:ext uri="{FF2B5EF4-FFF2-40B4-BE49-F238E27FC236}">
-                <a16:creationId xmlns:a16="http://schemas.microsoft.com/office/drawing/2014/main" id="{1667F365-7721-C9DE-B292-CB721CFFB0B9}"/>
-              </a:ext>
-            </a:extLst>
-          </p:cNvPr>
-          <p:cNvSpPr txBox="1"/>
+          <p:cNvPr id="3" name="Rectangle: Rounded Corners 2">
+            <a:extLst>
+              <a:ext uri="{FF2B5EF4-FFF2-40B4-BE49-F238E27FC236}">
+                <a16:creationId xmlns:a16="http://schemas.microsoft.com/office/drawing/2014/main" id="{5FCEF447-8F8A-35A4-20EE-929FE9C175CD}"/>
+              </a:ext>
+            </a:extLst>
+          </p:cNvPr>
+          <p:cNvSpPr/>
           <p:nvPr/>
         </p:nvSpPr>
         <p:spPr>
           <a:xfrm>
-            <a:off x="606829" y="3244334"/>
-            <a:ext cx="2435629" cy="369332"/>
+            <a:off x="606828" y="3203624"/>
+            <a:ext cx="1770611" cy="646331"/>
+          </a:xfrm>
+          <a:prstGeom prst="roundRect">
+            <a:avLst/>
+          </a:prstGeom>
+          <a:solidFill>
+            <a:srgbClr val="252323"/>
+          </a:solidFill>
+          <a:ln>
+            <a:noFill/>
+          </a:ln>
+        </p:spPr>
+        <p:style>
+          <a:lnRef idx="2">
+            <a:schemeClr val="accent1">
+              <a:shade val="50000"/>
+            </a:schemeClr>
+          </a:lnRef>
+          <a:fillRef idx="1">
+            <a:schemeClr val="accent1"/>
+          </a:fillRef>
+          <a:effectRef idx="0">
+            <a:schemeClr val="accent1"/>
+          </a:effectRef>
+          <a:fontRef idx="minor">
+            <a:schemeClr val="lt1"/>
+          </a:fontRef>
+        </p:style>
+        <p:txBody>
+          <a:bodyPr rtlCol="0" anchor="ctr"/>
+          <a:lstStyle/>
+          <a:p>
+            <a:pPr algn="ctr"/>
+            <a:endParaRPr lang="it-IT"/>
+          </a:p>
+        </p:txBody>
+      </p:sp>
+      <p:pic>
+        <p:nvPicPr>
+          <p:cNvPr id="6" name="Graphic 5">
+            <a:extLst>
+              <a:ext uri="{FF2B5EF4-FFF2-40B4-BE49-F238E27FC236}">
+                <a16:creationId xmlns:a16="http://schemas.microsoft.com/office/drawing/2014/main" id="{9BF3D3F4-0789-14C1-30D2-022C55B4036D}"/>
+              </a:ext>
+            </a:extLst>
+          </p:cNvPr>
+          <p:cNvPicPr>
+            <a:picLocks noChangeAspect="1"/>
+          </p:cNvPicPr>
+          <p:nvPr/>
+        </p:nvPicPr>
+        <p:blipFill>
+          <a:blip r:embed="rId4">
+            <a:extLst>
+              <a:ext uri="{28A0092B-C50C-407E-A947-70E740481C1C}">
+                <a14:useLocalDpi xmlns:a14="http://schemas.microsoft.com/office/drawing/2010/main" val="0"/>
+              </a:ext>
+              <a:ext uri="{96DAC541-7B7A-43D3-8B79-37D633B846F1}">
+                <asvg:svgBlip xmlns:asvg="http://schemas.microsoft.com/office/drawing/2016/SVG/main" r:embed="rId5"/>
+              </a:ext>
+            </a:extLst>
+          </a:blip>
+          <a:stretch>
+            <a:fillRect/>
+          </a:stretch>
+        </p:blipFill>
+        <p:spPr>
+          <a:xfrm>
+            <a:off x="823974" y="3294386"/>
+            <a:ext cx="1336317" cy="464806"/>
           </a:xfrm>
           <a:prstGeom prst="rect">
             <a:avLst/>
           </a:prstGeom>
-          <a:noFill/>
-        </p:spPr>
-        <p:txBody>
-          <a:bodyPr wrap="square" rtlCol="0">
-            <a:spAutoFit/>
-          </a:bodyPr>
-          <a:lstStyle/>
-          <a:p>
-            <a:r>
-              <a:rPr lang="en-US" dirty="0"/>
-              <a:t>…</a:t>
-            </a:r>
-            <a:endParaRPr lang="it-IT" dirty="0"/>
-          </a:p>
-        </p:txBody>
-      </p:sp>
+        </p:spPr>
+      </p:pic>
+      <p:sp>
+        <p:nvSpPr>
+          <p:cNvPr id="11" name="Rectangle: Rounded Corners 10">
+            <a:extLst>
+              <a:ext uri="{FF2B5EF4-FFF2-40B4-BE49-F238E27FC236}">
+                <a16:creationId xmlns:a16="http://schemas.microsoft.com/office/drawing/2014/main" id="{F3F3F405-44AD-3D6D-DD80-8227027C0E09}"/>
+              </a:ext>
+            </a:extLst>
+          </p:cNvPr>
+          <p:cNvSpPr/>
+          <p:nvPr/>
+        </p:nvSpPr>
+        <p:spPr>
+          <a:xfrm>
+            <a:off x="606826" y="4077623"/>
+            <a:ext cx="1770611" cy="646331"/>
+          </a:xfrm>
+          <a:prstGeom prst="roundRect">
+            <a:avLst/>
+          </a:prstGeom>
+          <a:solidFill>
+            <a:srgbClr val="252323"/>
+          </a:solidFill>
+          <a:ln>
+            <a:noFill/>
+          </a:ln>
+        </p:spPr>
+        <p:style>
+          <a:lnRef idx="2">
+            <a:schemeClr val="accent1">
+              <a:shade val="50000"/>
+            </a:schemeClr>
+          </a:lnRef>
+          <a:fillRef idx="1">
+            <a:schemeClr val="accent1"/>
+          </a:fillRef>
+          <a:effectRef idx="0">
+            <a:schemeClr val="accent1"/>
+          </a:effectRef>
+          <a:fontRef idx="minor">
+            <a:schemeClr val="lt1"/>
+          </a:fontRef>
+        </p:style>
+        <p:txBody>
+          <a:bodyPr rtlCol="0" anchor="ctr"/>
+          <a:lstStyle/>
+          <a:p>
+            <a:pPr algn="ctr"/>
+            <a:endParaRPr lang="it-IT"/>
+          </a:p>
+        </p:txBody>
+      </p:sp>
+      <p:pic>
+        <p:nvPicPr>
+          <p:cNvPr id="13" name="Graphic 12">
+            <a:extLst>
+              <a:ext uri="{FF2B5EF4-FFF2-40B4-BE49-F238E27FC236}">
+                <a16:creationId xmlns:a16="http://schemas.microsoft.com/office/drawing/2014/main" id="{151649DA-9F7A-B743-0350-00441DA6B4C1}"/>
+              </a:ext>
+            </a:extLst>
+          </p:cNvPr>
+          <p:cNvPicPr>
+            <a:picLocks noChangeAspect="1"/>
+          </p:cNvPicPr>
+          <p:nvPr/>
+        </p:nvPicPr>
+        <p:blipFill>
+          <a:blip r:embed="rId6">
+            <a:extLst>
+              <a:ext uri="{28A0092B-C50C-407E-A947-70E740481C1C}">
+                <a14:useLocalDpi xmlns:a14="http://schemas.microsoft.com/office/drawing/2010/main" val="0"/>
+              </a:ext>
+              <a:ext uri="{96DAC541-7B7A-43D3-8B79-37D633B846F1}">
+                <asvg:svgBlip xmlns:asvg="http://schemas.microsoft.com/office/drawing/2016/SVG/main" r:embed="rId7"/>
+              </a:ext>
+            </a:extLst>
+          </a:blip>
+          <a:stretch>
+            <a:fillRect/>
+          </a:stretch>
+        </p:blipFill>
+        <p:spPr>
+          <a:xfrm>
+            <a:off x="696622" y="4270909"/>
+            <a:ext cx="1591018" cy="259758"/>
+          </a:xfrm>
+          <a:prstGeom prst="rect">
+            <a:avLst/>
+          </a:prstGeom>
+        </p:spPr>
+      </p:pic>
+      <p:sp>
+        <p:nvSpPr>
+          <p:cNvPr id="14" name="Rectangle: Rounded Corners 13">
+            <a:extLst>
+              <a:ext uri="{FF2B5EF4-FFF2-40B4-BE49-F238E27FC236}">
+                <a16:creationId xmlns:a16="http://schemas.microsoft.com/office/drawing/2014/main" id="{22F77A5C-E940-FC47-1997-C6F0F3ACA1E8}"/>
+              </a:ext>
+            </a:extLst>
+          </p:cNvPr>
+          <p:cNvSpPr/>
+          <p:nvPr/>
+        </p:nvSpPr>
+        <p:spPr>
+          <a:xfrm>
+            <a:off x="606826" y="4903807"/>
+            <a:ext cx="1770611" cy="646331"/>
+          </a:xfrm>
+          <a:prstGeom prst="roundRect">
+            <a:avLst/>
+          </a:prstGeom>
+          <a:solidFill>
+            <a:srgbClr val="252323"/>
+          </a:solidFill>
+          <a:ln>
+            <a:noFill/>
+          </a:ln>
+        </p:spPr>
+        <p:style>
+          <a:lnRef idx="2">
+            <a:schemeClr val="accent1">
+              <a:shade val="50000"/>
+            </a:schemeClr>
+          </a:lnRef>
+          <a:fillRef idx="1">
+            <a:schemeClr val="accent1"/>
+          </a:fillRef>
+          <a:effectRef idx="0">
+            <a:schemeClr val="accent1"/>
+          </a:effectRef>
+          <a:fontRef idx="minor">
+            <a:schemeClr val="lt1"/>
+          </a:fontRef>
+        </p:style>
+        <p:txBody>
+          <a:bodyPr rtlCol="0" anchor="ctr"/>
+          <a:lstStyle/>
+          <a:p>
+            <a:pPr algn="ctr"/>
+            <a:endParaRPr lang="it-IT"/>
+          </a:p>
+        </p:txBody>
+      </p:sp>
+      <p:pic>
+        <p:nvPicPr>
+          <p:cNvPr id="16" name="Graphic 15">
+            <a:extLst>
+              <a:ext uri="{FF2B5EF4-FFF2-40B4-BE49-F238E27FC236}">
+                <a16:creationId xmlns:a16="http://schemas.microsoft.com/office/drawing/2014/main" id="{30F20E17-0EAE-68CA-2803-79843FBCB75F}"/>
+              </a:ext>
+            </a:extLst>
+          </p:cNvPr>
+          <p:cNvPicPr>
+            <a:picLocks noChangeAspect="1"/>
+          </p:cNvPicPr>
+          <p:nvPr/>
+        </p:nvPicPr>
+        <p:blipFill>
+          <a:blip r:embed="rId8">
+            <a:extLst>
+              <a:ext uri="{28A0092B-C50C-407E-A947-70E740481C1C}">
+                <a14:useLocalDpi xmlns:a14="http://schemas.microsoft.com/office/drawing/2010/main" val="0"/>
+              </a:ext>
+              <a:ext uri="{96DAC541-7B7A-43D3-8B79-37D633B846F1}">
+                <asvg:svgBlip xmlns:asvg="http://schemas.microsoft.com/office/drawing/2016/SVG/main" r:embed="rId9"/>
+              </a:ext>
+            </a:extLst>
+          </a:blip>
+          <a:stretch>
+            <a:fillRect/>
+          </a:stretch>
+        </p:blipFill>
+        <p:spPr>
+          <a:xfrm>
+            <a:off x="823974" y="5000796"/>
+            <a:ext cx="1334435" cy="452351"/>
+          </a:xfrm>
+          <a:prstGeom prst="rect">
+            <a:avLst/>
+          </a:prstGeom>
+        </p:spPr>
+      </p:pic>
+      <p:sp>
+        <p:nvSpPr>
+          <p:cNvPr id="17" name="Rectangle: Rounded Corners 16">
+            <a:extLst>
+              <a:ext uri="{FF2B5EF4-FFF2-40B4-BE49-F238E27FC236}">
+                <a16:creationId xmlns:a16="http://schemas.microsoft.com/office/drawing/2014/main" id="{0E9E16E2-EFEB-85D1-2673-AFEFAECCA745}"/>
+              </a:ext>
+            </a:extLst>
+          </p:cNvPr>
+          <p:cNvSpPr/>
+          <p:nvPr/>
+        </p:nvSpPr>
+        <p:spPr>
+          <a:xfrm>
+            <a:off x="605885" y="5777344"/>
+            <a:ext cx="1770611" cy="646331"/>
+          </a:xfrm>
+          <a:prstGeom prst="roundRect">
+            <a:avLst/>
+          </a:prstGeom>
+          <a:solidFill>
+            <a:srgbClr val="252323"/>
+          </a:solidFill>
+          <a:ln>
+            <a:noFill/>
+          </a:ln>
+        </p:spPr>
+        <p:style>
+          <a:lnRef idx="2">
+            <a:schemeClr val="accent1">
+              <a:shade val="50000"/>
+            </a:schemeClr>
+          </a:lnRef>
+          <a:fillRef idx="1">
+            <a:schemeClr val="accent1"/>
+          </a:fillRef>
+          <a:effectRef idx="0">
+            <a:schemeClr val="accent1"/>
+          </a:effectRef>
+          <a:fontRef idx="minor">
+            <a:schemeClr val="lt1"/>
+          </a:fontRef>
+        </p:style>
+        <p:txBody>
+          <a:bodyPr rtlCol="0" anchor="ctr"/>
+          <a:lstStyle/>
+          <a:p>
+            <a:pPr algn="ctr"/>
+            <a:endParaRPr lang="it-IT"/>
+          </a:p>
+        </p:txBody>
+      </p:sp>
+      <p:pic>
+        <p:nvPicPr>
+          <p:cNvPr id="19" name="Graphic 18">
+            <a:extLst>
+              <a:ext uri="{FF2B5EF4-FFF2-40B4-BE49-F238E27FC236}">
+                <a16:creationId xmlns:a16="http://schemas.microsoft.com/office/drawing/2014/main" id="{A5456102-C876-ADF8-D935-F0DB4EC8EB58}"/>
+              </a:ext>
+            </a:extLst>
+          </p:cNvPr>
+          <p:cNvPicPr>
+            <a:picLocks noChangeAspect="1"/>
+          </p:cNvPicPr>
+          <p:nvPr/>
+        </p:nvPicPr>
+        <p:blipFill>
+          <a:blip r:embed="rId10">
+            <a:extLst>
+              <a:ext uri="{28A0092B-C50C-407E-A947-70E740481C1C}">
+                <a14:useLocalDpi xmlns:a14="http://schemas.microsoft.com/office/drawing/2010/main" val="0"/>
+              </a:ext>
+              <a:ext uri="{96DAC541-7B7A-43D3-8B79-37D633B846F1}">
+                <asvg:svgBlip xmlns:asvg="http://schemas.microsoft.com/office/drawing/2016/SVG/main" r:embed="rId11"/>
+              </a:ext>
+            </a:extLst>
+          </a:blip>
+          <a:stretch>
+            <a:fillRect/>
+          </a:stretch>
+        </p:blipFill>
+        <p:spPr>
+          <a:xfrm>
+            <a:off x="724848" y="5942567"/>
+            <a:ext cx="1562792" cy="315884"/>
+          </a:xfrm>
+          <a:prstGeom prst="rect">
+            <a:avLst/>
+          </a:prstGeom>
+        </p:spPr>
+      </p:pic>
+      <p:sp>
+        <p:nvSpPr>
+          <p:cNvPr id="20" name="Rectangle: Rounded Corners 19">
+            <a:extLst>
+              <a:ext uri="{FF2B5EF4-FFF2-40B4-BE49-F238E27FC236}">
+                <a16:creationId xmlns:a16="http://schemas.microsoft.com/office/drawing/2014/main" id="{DC140044-2FBC-0E4D-6E66-FC656985A28A}"/>
+              </a:ext>
+            </a:extLst>
+          </p:cNvPr>
+          <p:cNvSpPr/>
+          <p:nvPr/>
+        </p:nvSpPr>
+        <p:spPr>
+          <a:xfrm>
+            <a:off x="2593645" y="4903807"/>
+            <a:ext cx="1770611" cy="646331"/>
+          </a:xfrm>
+          <a:prstGeom prst="roundRect">
+            <a:avLst/>
+          </a:prstGeom>
+          <a:solidFill>
+            <a:srgbClr val="252323"/>
+          </a:solidFill>
+          <a:ln>
+            <a:noFill/>
+          </a:ln>
+        </p:spPr>
+        <p:style>
+          <a:lnRef idx="2">
+            <a:schemeClr val="accent1">
+              <a:shade val="50000"/>
+            </a:schemeClr>
+          </a:lnRef>
+          <a:fillRef idx="1">
+            <a:schemeClr val="accent1"/>
+          </a:fillRef>
+          <a:effectRef idx="0">
+            <a:schemeClr val="accent1"/>
+          </a:effectRef>
+          <a:fontRef idx="minor">
+            <a:schemeClr val="lt1"/>
+          </a:fontRef>
+        </p:style>
+        <p:txBody>
+          <a:bodyPr rtlCol="0" anchor="ctr"/>
+          <a:lstStyle/>
+          <a:p>
+            <a:pPr algn="ctr"/>
+            <a:endParaRPr lang="it-IT"/>
+          </a:p>
+        </p:txBody>
+      </p:sp>
+      <p:pic>
+        <p:nvPicPr>
+          <p:cNvPr id="22" name="Graphic 21">
+            <a:extLst>
+              <a:ext uri="{FF2B5EF4-FFF2-40B4-BE49-F238E27FC236}">
+                <a16:creationId xmlns:a16="http://schemas.microsoft.com/office/drawing/2014/main" id="{3B3B3E57-45CA-9EF5-7E35-B2913430EA63}"/>
+              </a:ext>
+            </a:extLst>
+          </p:cNvPr>
+          <p:cNvPicPr>
+            <a:picLocks noChangeAspect="1"/>
+          </p:cNvPicPr>
+          <p:nvPr/>
+        </p:nvPicPr>
+        <p:blipFill>
+          <a:blip r:embed="rId12">
+            <a:extLst>
+              <a:ext uri="{28A0092B-C50C-407E-A947-70E740481C1C}">
+                <a14:useLocalDpi xmlns:a14="http://schemas.microsoft.com/office/drawing/2010/main" val="0"/>
+              </a:ext>
+              <a:ext uri="{96DAC541-7B7A-43D3-8B79-37D633B846F1}">
+                <asvg:svgBlip xmlns:asvg="http://schemas.microsoft.com/office/drawing/2016/SVG/main" r:embed="rId13"/>
+              </a:ext>
+            </a:extLst>
+          </a:blip>
+          <a:stretch>
+            <a:fillRect/>
+          </a:stretch>
+        </p:blipFill>
+        <p:spPr>
+          <a:xfrm>
+            <a:off x="2803369" y="5107371"/>
+            <a:ext cx="1351162" cy="229985"/>
+          </a:xfrm>
+          <a:prstGeom prst="rect">
+            <a:avLst/>
+          </a:prstGeom>
+        </p:spPr>
+      </p:pic>
+      <p:sp>
+        <p:nvSpPr>
+          <p:cNvPr id="23" name="Rectangle: Rounded Corners 22">
+            <a:extLst>
+              <a:ext uri="{FF2B5EF4-FFF2-40B4-BE49-F238E27FC236}">
+                <a16:creationId xmlns:a16="http://schemas.microsoft.com/office/drawing/2014/main" id="{8818130D-34C5-FF72-38B3-4BDD8D75155D}"/>
+              </a:ext>
+            </a:extLst>
+          </p:cNvPr>
+          <p:cNvSpPr/>
+          <p:nvPr/>
+        </p:nvSpPr>
+        <p:spPr>
+          <a:xfrm>
+            <a:off x="2593644" y="5777806"/>
+            <a:ext cx="1770611" cy="646331"/>
+          </a:xfrm>
+          <a:prstGeom prst="roundRect">
+            <a:avLst/>
+          </a:prstGeom>
+          <a:solidFill>
+            <a:srgbClr val="252323"/>
+          </a:solidFill>
+          <a:ln>
+            <a:noFill/>
+          </a:ln>
+        </p:spPr>
+        <p:style>
+          <a:lnRef idx="2">
+            <a:schemeClr val="accent1">
+              <a:shade val="50000"/>
+            </a:schemeClr>
+          </a:lnRef>
+          <a:fillRef idx="1">
+            <a:schemeClr val="accent1"/>
+          </a:fillRef>
+          <a:effectRef idx="0">
+            <a:schemeClr val="accent1"/>
+          </a:effectRef>
+          <a:fontRef idx="minor">
+            <a:schemeClr val="lt1"/>
+          </a:fontRef>
+        </p:style>
+        <p:txBody>
+          <a:bodyPr rtlCol="0" anchor="ctr"/>
+          <a:lstStyle/>
+          <a:p>
+            <a:pPr algn="ctr"/>
+            <a:endParaRPr lang="it-IT"/>
+          </a:p>
+        </p:txBody>
+      </p:sp>
+      <p:pic>
+        <p:nvPicPr>
+          <p:cNvPr id="25" name="Graphic 24">
+            <a:extLst>
+              <a:ext uri="{FF2B5EF4-FFF2-40B4-BE49-F238E27FC236}">
+                <a16:creationId xmlns:a16="http://schemas.microsoft.com/office/drawing/2014/main" id="{B1D56884-9F77-B123-020D-BB405E0F2E14}"/>
+              </a:ext>
+            </a:extLst>
+          </p:cNvPr>
+          <p:cNvPicPr>
+            <a:picLocks noChangeAspect="1"/>
+          </p:cNvPicPr>
+          <p:nvPr/>
+        </p:nvPicPr>
+        <p:blipFill>
+          <a:blip r:embed="rId14">
+            <a:extLst>
+              <a:ext uri="{28A0092B-C50C-407E-A947-70E740481C1C}">
+                <a14:useLocalDpi xmlns:a14="http://schemas.microsoft.com/office/drawing/2010/main" val="0"/>
+              </a:ext>
+              <a:ext uri="{96DAC541-7B7A-43D3-8B79-37D633B846F1}">
+                <asvg:svgBlip xmlns:asvg="http://schemas.microsoft.com/office/drawing/2016/SVG/main" r:embed="rId15"/>
+              </a:ext>
+            </a:extLst>
+          </a:blip>
+          <a:stretch>
+            <a:fillRect/>
+          </a:stretch>
+        </p:blipFill>
+        <p:spPr>
+          <a:xfrm>
+            <a:off x="2813525" y="5862056"/>
+            <a:ext cx="1341006" cy="477830"/>
+          </a:xfrm>
+          <a:prstGeom prst="rect">
+            <a:avLst/>
+          </a:prstGeom>
+        </p:spPr>
+      </p:pic>
     </p:spTree>
     <p:extLst>
       <p:ext uri="{BB962C8B-B14F-4D97-AF65-F5344CB8AC3E}">

</xml_diff>